<commit_message>
Begin script for presentation.
</commit_message>
<xml_diff>
--- a/presentation/SPIN2022.pptx
+++ b/presentation/SPIN2022.pptx
@@ -129,6 +129,52 @@
 </p:presentation>
 </file>
 
+<file path=ppt/authors.xml><?xml version="1.0" encoding="utf-8"?>
+<p188:authorLst xmlns:a="http://schemas.openxmlformats.org/drawingml/2006/main" xmlns:r="http://schemas.openxmlformats.org/officeDocument/2006/relationships" xmlns:p188="http://schemas.microsoft.com/office/powerpoint/2018/8/main">
+  <p188:author id="{2047F790-A760-A233-90F9-8943DDACFEB7}" name="Parker Hanson" initials="PH" userId="Parker Hanson" providerId="None"/>
+</p188:authorLst>
+</file>
+
+<file path=ppt/comments/modernComment_110_EF993C80.xml><?xml version="1.0" encoding="utf-8"?>
+<p188:cmLst xmlns:a="http://schemas.openxmlformats.org/drawingml/2006/main" xmlns:r="http://schemas.openxmlformats.org/officeDocument/2006/relationships" xmlns:p188="http://schemas.microsoft.com/office/powerpoint/2018/8/main">
+  <p188:cm id="{EA0E8BA7-7854-472F-B1D3-F39F990E67FF}" authorId="{2047F790-A760-A233-90F9-8943DDACFEB7}" created="2022-05-19T00:44:11.223">
+    <ac:txMkLst xmlns:ac="http://schemas.microsoft.com/office/drawing/2013/main/command">
+      <pc:docMk xmlns:pc="http://schemas.microsoft.com/office/powerpoint/2013/main/command"/>
+      <pc:sldMk xmlns:pc="http://schemas.microsoft.com/office/powerpoint/2013/main/command" cId="4019797120" sldId="272"/>
+      <ac:spMk id="21" creationId="{D4EE9CAC-5C9B-9C40-A030-757CE0B5B310}"/>
+      <ac:txMk cp="4" len="3">
+        <ac:context len="28" hash="4099824638"/>
+      </ac:txMk>
+    </ac:txMkLst>
+    <p188:pos x="1471931" y="317299"/>
+    <p188:replyLst>
+      <p188:reply id="{FC1A7384-E593-402F-BD89-F6C1C17E4DA1}" authorId="{2047F790-A760-A233-90F9-8943DDACFEB7}" created="2022-05-19T00:44:34.992">
+        <p188:txBody>
+          <a:bodyPr/>
+          <a:lstStyle/>
+          <a:p>
+            <a:r>
+              <a:rPr lang="en-US"/>
+              <a:t>Main issues were typing and iterative stream setup.</a:t>
+            </a:r>
+          </a:p>
+        </p188:txBody>
+      </p188:reply>
+    </p188:replyLst>
+    <p188:txBody>
+      <a:bodyPr/>
+      <a:lstStyle/>
+      <a:p>
+        <a:r>
+          <a:rPr lang="en-US"/>
+          <a:t>Is this the proper term?</a:t>
+        </a:r>
+      </a:p>
+    </p188:txBody>
+  </p188:cm>
+</p188:cmLst>
+</file>
+
 <file path=ppt/notesMasters/notesMaster1.xml><?xml version="1.0" encoding="utf-8"?>
 <p:notesMaster xmlns:a="http://schemas.openxmlformats.org/drawingml/2006/main" xmlns:r="http://schemas.openxmlformats.org/officeDocument/2006/relationships" xmlns:p="http://schemas.openxmlformats.org/presentationml/2006/main">
   <p:cSld>
@@ -211,7 +257,7 @@
           <a:p>
             <a:fld id="{6E742D25-F818-3F41-A083-9D0C2C4584D2}" type="datetimeFigureOut">
               <a:rPr lang="en-US" smtClean="0"/>
-              <a:t>5/18/22</a:t>
+              <a:t>5/18/2022</a:t>
             </a:fld>
             <a:endParaRPr lang="en-US"/>
           </a:p>
@@ -522,7 +568,24 @@
           <a:bodyPr/>
           <a:lstStyle/>
           <a:p>
-            <a:endParaRPr lang="en-US" dirty="0"/>
+            <a:r>
+              <a:rPr lang="en-US" dirty="0"/>
+              <a:t>My name is Parker Hanson, and I’m an adult.</a:t>
+            </a:r>
+          </a:p>
+          <a:p>
+            <a:r>
+              <a:rPr lang="en-US" dirty="0"/>
+              <a:t>My dad </a:t>
+            </a:r>
+            <a:r>
+              <a:rPr lang="en-US" dirty="0" err="1"/>
+              <a:t>ain’t</a:t>
+            </a:r>
+            <a:r>
+              <a:rPr lang="en-US" dirty="0"/>
+              <a:t> a cell phone.</a:t>
+            </a:r>
           </a:p>
         </p:txBody>
       </p:sp>
@@ -553,6 +616,638 @@
     <p:extLst>
       <p:ext uri="{BB962C8B-B14F-4D97-AF65-F5344CB8AC3E}">
         <p14:creationId xmlns:p14="http://schemas.microsoft.com/office/powerpoint/2010/main" val="3372379462"/>
+      </p:ext>
+    </p:extLst>
+  </p:cSld>
+  <p:clrMapOvr>
+    <a:masterClrMapping/>
+  </p:clrMapOvr>
+</p:notes>
+</file>
+
+<file path=ppt/notesSlides/notesSlide10.xml><?xml version="1.0" encoding="utf-8"?>
+<p:notes xmlns:a="http://schemas.openxmlformats.org/drawingml/2006/main" xmlns:r="http://schemas.openxmlformats.org/officeDocument/2006/relationships" xmlns:p="http://schemas.openxmlformats.org/presentationml/2006/main">
+  <p:cSld>
+    <p:spTree>
+      <p:nvGrpSpPr>
+        <p:cNvPr id="1" name=""/>
+        <p:cNvGrpSpPr/>
+        <p:nvPr/>
+      </p:nvGrpSpPr>
+      <p:grpSpPr>
+        <a:xfrm>
+          <a:off x="0" y="0"/>
+          <a:ext cx="0" cy="0"/>
+          <a:chOff x="0" y="0"/>
+          <a:chExt cx="0" cy="0"/>
+        </a:xfrm>
+      </p:grpSpPr>
+      <p:sp>
+        <p:nvSpPr>
+          <p:cNvPr id="2" name="Slide Image Placeholder 1"/>
+          <p:cNvSpPr>
+            <a:spLocks noGrp="1" noRot="1" noChangeAspect="1"/>
+          </p:cNvSpPr>
+          <p:nvPr>
+            <p:ph type="sldImg"/>
+          </p:nvPr>
+        </p:nvSpPr>
+        <p:spPr/>
+      </p:sp>
+      <p:sp>
+        <p:nvSpPr>
+          <p:cNvPr id="3" name="Notes Placeholder 2"/>
+          <p:cNvSpPr>
+            <a:spLocks noGrp="1"/>
+          </p:cNvSpPr>
+          <p:nvPr>
+            <p:ph type="body" idx="1"/>
+          </p:nvPr>
+        </p:nvSpPr>
+        <p:spPr/>
+        <p:txBody>
+          <a:bodyPr/>
+          <a:lstStyle/>
+          <a:p>
+            <a:r>
+              <a:rPr lang="en-US" dirty="0"/>
+              <a:t>Since the NIST standard is written in a document, visual inspection is impossible to avoid.</a:t>
+            </a:r>
+          </a:p>
+          <a:p>
+            <a:r>
+              <a:rPr lang="en-US" dirty="0"/>
+              <a:t>By leveraging our higher-order functions we produced a visually comparable </a:t>
+            </a:r>
+            <a:r>
+              <a:rPr lang="en-US" dirty="0" err="1"/>
+              <a:t>Cryptol</a:t>
+            </a:r>
+            <a:r>
+              <a:rPr lang="en-US" dirty="0"/>
+              <a:t> implementation of SHA3.</a:t>
+            </a:r>
+          </a:p>
+          <a:p>
+            <a:r>
+              <a:rPr lang="en-US" dirty="0"/>
+              <a:t>We also relied on the provided NIST test vectors for additional assurance of correctness.</a:t>
+            </a:r>
+          </a:p>
+        </p:txBody>
+      </p:sp>
+      <p:sp>
+        <p:nvSpPr>
+          <p:cNvPr id="4" name="Slide Number Placeholder 3"/>
+          <p:cNvSpPr>
+            <a:spLocks noGrp="1"/>
+          </p:cNvSpPr>
+          <p:nvPr>
+            <p:ph type="sldNum" sz="quarter" idx="5"/>
+          </p:nvPr>
+        </p:nvSpPr>
+        <p:spPr/>
+        <p:txBody>
+          <a:bodyPr/>
+          <a:lstStyle/>
+          <a:p>
+            <a:fld id="{F9212696-0A7F-9A4B-8E6F-F66892427D89}" type="slidenum">
+              <a:rPr lang="en-US" smtClean="0"/>
+              <a:t>10</a:t>
+            </a:fld>
+            <a:endParaRPr lang="en-US"/>
+          </a:p>
+        </p:txBody>
+      </p:sp>
+    </p:spTree>
+    <p:extLst>
+      <p:ext uri="{BB962C8B-B14F-4D97-AF65-F5344CB8AC3E}">
+        <p14:creationId xmlns:p14="http://schemas.microsoft.com/office/powerpoint/2010/main" val="219260823"/>
+      </p:ext>
+    </p:extLst>
+  </p:cSld>
+  <p:clrMapOvr>
+    <a:masterClrMapping/>
+  </p:clrMapOvr>
+</p:notes>
+</file>
+
+<file path=ppt/notesSlides/notesSlide11.xml><?xml version="1.0" encoding="utf-8"?>
+<p:notes xmlns:a="http://schemas.openxmlformats.org/drawingml/2006/main" xmlns:r="http://schemas.openxmlformats.org/officeDocument/2006/relationships" xmlns:p="http://schemas.openxmlformats.org/presentationml/2006/main">
+  <p:cSld>
+    <p:spTree>
+      <p:nvGrpSpPr>
+        <p:cNvPr id="1" name=""/>
+        <p:cNvGrpSpPr/>
+        <p:nvPr/>
+      </p:nvGrpSpPr>
+      <p:grpSpPr>
+        <a:xfrm>
+          <a:off x="0" y="0"/>
+          <a:ext cx="0" cy="0"/>
+          <a:chOff x="0" y="0"/>
+          <a:chExt cx="0" cy="0"/>
+        </a:xfrm>
+      </p:grpSpPr>
+      <p:sp>
+        <p:nvSpPr>
+          <p:cNvPr id="2" name="Slide Image Placeholder 1"/>
+          <p:cNvSpPr>
+            <a:spLocks noGrp="1" noRot="1" noChangeAspect="1"/>
+          </p:cNvSpPr>
+          <p:nvPr>
+            <p:ph type="sldImg"/>
+          </p:nvPr>
+        </p:nvSpPr>
+        <p:spPr/>
+      </p:sp>
+      <p:sp>
+        <p:nvSpPr>
+          <p:cNvPr id="3" name="Notes Placeholder 2"/>
+          <p:cNvSpPr>
+            <a:spLocks noGrp="1"/>
+          </p:cNvSpPr>
+          <p:nvPr>
+            <p:ph type="body" idx="1"/>
+          </p:nvPr>
+        </p:nvSpPr>
+        <p:spPr/>
+        <p:txBody>
+          <a:bodyPr/>
+          <a:lstStyle/>
+          <a:p>
+            <a:r>
+              <a:rPr lang="en-US" dirty="0"/>
+              <a:t>OpenSSL’s C implementation formatted the intermediate state differently from the NIST standard.</a:t>
+            </a:r>
+          </a:p>
+          <a:p>
+            <a:r>
+              <a:rPr lang="en-US" dirty="0"/>
+              <a:t>A direct comparison from our visually reviewable </a:t>
+            </a:r>
+            <a:r>
+              <a:rPr lang="en-US" dirty="0" err="1"/>
+              <a:t>Cryptol</a:t>
+            </a:r>
+            <a:r>
+              <a:rPr lang="en-US" dirty="0"/>
+              <a:t> implementation to the OpenSSL implementation was too complex to complete with SAW.</a:t>
+            </a:r>
+          </a:p>
+          <a:p>
+            <a:r>
+              <a:rPr lang="en-US" dirty="0"/>
+              <a:t>Because </a:t>
+            </a:r>
+            <a:r>
+              <a:rPr lang="en-US" dirty="0" err="1"/>
+              <a:t>Cryptol</a:t>
+            </a:r>
+            <a:r>
+              <a:rPr lang="en-US" dirty="0"/>
+              <a:t> is natively supported in SAW, </a:t>
+            </a:r>
+            <a:r>
+              <a:rPr lang="en-US" dirty="0" err="1"/>
+              <a:t>Cryptol</a:t>
+            </a:r>
+            <a:r>
+              <a:rPr lang="en-US" dirty="0"/>
+              <a:t> to </a:t>
+            </a:r>
+            <a:r>
+              <a:rPr lang="en-US" dirty="0" err="1"/>
+              <a:t>Cryptol</a:t>
+            </a:r>
+            <a:r>
+              <a:rPr lang="en-US" dirty="0"/>
+              <a:t> comparisons are more feasible.</a:t>
+            </a:r>
+          </a:p>
+          <a:p>
+            <a:r>
+              <a:rPr lang="en-US" dirty="0"/>
+              <a:t>We produced a second </a:t>
+            </a:r>
+            <a:r>
+              <a:rPr lang="en-US" dirty="0" err="1"/>
+              <a:t>Cryptol</a:t>
+            </a:r>
+            <a:r>
+              <a:rPr lang="en-US" dirty="0"/>
+              <a:t> implementation that followed the OpenSSL’s memory layout and proved the equivalence between the two </a:t>
+            </a:r>
+            <a:r>
+              <a:rPr lang="en-US" dirty="0" err="1"/>
+              <a:t>Cryptol</a:t>
+            </a:r>
+            <a:r>
+              <a:rPr lang="en-US" dirty="0"/>
+              <a:t> implementations.</a:t>
+            </a:r>
+          </a:p>
+          <a:p>
+            <a:r>
+              <a:rPr lang="en-US" dirty="0"/>
+              <a:t>Due to differences in memory, this was done at the top level of the SHA3 algorithm.</a:t>
+            </a:r>
+          </a:p>
+          <a:p>
+            <a:r>
+              <a:rPr lang="en-US" dirty="0"/>
+              <a:t>Strict typing constraints required us to verify for each critical input message size.</a:t>
+            </a:r>
+          </a:p>
+          <a:p>
+            <a:r>
+              <a:rPr lang="en-US" dirty="0"/>
+              <a:t>By verifying all message lengths from 0 to 1088 bits, all possible padding inputs, we covered every conceivable branch.</a:t>
+            </a:r>
+          </a:p>
+        </p:txBody>
+      </p:sp>
+      <p:sp>
+        <p:nvSpPr>
+          <p:cNvPr id="4" name="Slide Number Placeholder 3"/>
+          <p:cNvSpPr>
+            <a:spLocks noGrp="1"/>
+          </p:cNvSpPr>
+          <p:nvPr>
+            <p:ph type="sldNum" sz="quarter" idx="5"/>
+          </p:nvPr>
+        </p:nvSpPr>
+        <p:spPr/>
+        <p:txBody>
+          <a:bodyPr/>
+          <a:lstStyle/>
+          <a:p>
+            <a:fld id="{F9212696-0A7F-9A4B-8E6F-F66892427D89}" type="slidenum">
+              <a:rPr lang="en-US" smtClean="0"/>
+              <a:t>11</a:t>
+            </a:fld>
+            <a:endParaRPr lang="en-US"/>
+          </a:p>
+        </p:txBody>
+      </p:sp>
+    </p:spTree>
+    <p:extLst>
+      <p:ext uri="{BB962C8B-B14F-4D97-AF65-F5344CB8AC3E}">
+        <p14:creationId xmlns:p14="http://schemas.microsoft.com/office/powerpoint/2010/main" val="4142389940"/>
+      </p:ext>
+    </p:extLst>
+  </p:cSld>
+  <p:clrMapOvr>
+    <a:masterClrMapping/>
+  </p:clrMapOvr>
+</p:notes>
+</file>
+
+<file path=ppt/notesSlides/notesSlide12.xml><?xml version="1.0" encoding="utf-8"?>
+<p:notes xmlns:a="http://schemas.openxmlformats.org/drawingml/2006/main" xmlns:r="http://schemas.openxmlformats.org/officeDocument/2006/relationships" xmlns:p="http://schemas.openxmlformats.org/presentationml/2006/main">
+  <p:cSld>
+    <p:spTree>
+      <p:nvGrpSpPr>
+        <p:cNvPr id="1" name=""/>
+        <p:cNvGrpSpPr/>
+        <p:nvPr/>
+      </p:nvGrpSpPr>
+      <p:grpSpPr>
+        <a:xfrm>
+          <a:off x="0" y="0"/>
+          <a:ext cx="0" cy="0"/>
+          <a:chOff x="0" y="0"/>
+          <a:chExt cx="0" cy="0"/>
+        </a:xfrm>
+      </p:grpSpPr>
+      <p:sp>
+        <p:nvSpPr>
+          <p:cNvPr id="2" name="Slide Image Placeholder 1"/>
+          <p:cNvSpPr>
+            <a:spLocks noGrp="1" noRot="1" noChangeAspect="1"/>
+          </p:cNvSpPr>
+          <p:nvPr>
+            <p:ph type="sldImg"/>
+          </p:nvPr>
+        </p:nvSpPr>
+        <p:spPr/>
+      </p:sp>
+      <p:sp>
+        <p:nvSpPr>
+          <p:cNvPr id="3" name="Notes Placeholder 2"/>
+          <p:cNvSpPr>
+            <a:spLocks noGrp="1"/>
+          </p:cNvSpPr>
+          <p:nvPr>
+            <p:ph type="body" idx="1"/>
+          </p:nvPr>
+        </p:nvSpPr>
+        <p:spPr/>
+        <p:txBody>
+          <a:bodyPr/>
+          <a:lstStyle/>
+          <a:p>
+            <a:r>
+              <a:rPr lang="en-US" dirty="0"/>
+              <a:t>&lt;What should we cover here?&gt;</a:t>
+            </a:r>
+          </a:p>
+        </p:txBody>
+      </p:sp>
+      <p:sp>
+        <p:nvSpPr>
+          <p:cNvPr id="4" name="Slide Number Placeholder 3"/>
+          <p:cNvSpPr>
+            <a:spLocks noGrp="1"/>
+          </p:cNvSpPr>
+          <p:nvPr>
+            <p:ph type="sldNum" sz="quarter" idx="5"/>
+          </p:nvPr>
+        </p:nvSpPr>
+        <p:spPr/>
+        <p:txBody>
+          <a:bodyPr/>
+          <a:lstStyle/>
+          <a:p>
+            <a:fld id="{F9212696-0A7F-9A4B-8E6F-F66892427D89}" type="slidenum">
+              <a:rPr lang="en-US" smtClean="0"/>
+              <a:t>12</a:t>
+            </a:fld>
+            <a:endParaRPr lang="en-US"/>
+          </a:p>
+        </p:txBody>
+      </p:sp>
+    </p:spTree>
+    <p:extLst>
+      <p:ext uri="{BB962C8B-B14F-4D97-AF65-F5344CB8AC3E}">
+        <p14:creationId xmlns:p14="http://schemas.microsoft.com/office/powerpoint/2010/main" val="2212572720"/>
+      </p:ext>
+    </p:extLst>
+  </p:cSld>
+  <p:clrMapOvr>
+    <a:masterClrMapping/>
+  </p:clrMapOvr>
+</p:notes>
+</file>
+
+<file path=ppt/notesSlides/notesSlide13.xml><?xml version="1.0" encoding="utf-8"?>
+<p:notes xmlns:a="http://schemas.openxmlformats.org/drawingml/2006/main" xmlns:r="http://schemas.openxmlformats.org/officeDocument/2006/relationships" xmlns:p="http://schemas.openxmlformats.org/presentationml/2006/main">
+  <p:cSld>
+    <p:spTree>
+      <p:nvGrpSpPr>
+        <p:cNvPr id="1" name=""/>
+        <p:cNvGrpSpPr/>
+        <p:nvPr/>
+      </p:nvGrpSpPr>
+      <p:grpSpPr>
+        <a:xfrm>
+          <a:off x="0" y="0"/>
+          <a:ext cx="0" cy="0"/>
+          <a:chOff x="0" y="0"/>
+          <a:chExt cx="0" cy="0"/>
+        </a:xfrm>
+      </p:grpSpPr>
+      <p:sp>
+        <p:nvSpPr>
+          <p:cNvPr id="2" name="Slide Image Placeholder 1"/>
+          <p:cNvSpPr>
+            <a:spLocks noGrp="1" noRot="1" noChangeAspect="1"/>
+          </p:cNvSpPr>
+          <p:nvPr>
+            <p:ph type="sldImg"/>
+          </p:nvPr>
+        </p:nvSpPr>
+        <p:spPr/>
+      </p:sp>
+      <p:sp>
+        <p:nvSpPr>
+          <p:cNvPr id="3" name="Notes Placeholder 2"/>
+          <p:cNvSpPr>
+            <a:spLocks noGrp="1"/>
+          </p:cNvSpPr>
+          <p:nvPr>
+            <p:ph type="body" idx="1"/>
+          </p:nvPr>
+        </p:nvSpPr>
+        <p:spPr/>
+        <p:txBody>
+          <a:bodyPr/>
+          <a:lstStyle/>
+          <a:p>
+            <a:r>
+              <a:rPr lang="en-US" dirty="0"/>
+              <a:t>Keccak was too difficult to prove, yet due to its modularity we could prove each of the inner functions individually.</a:t>
+            </a:r>
+          </a:p>
+        </p:txBody>
+      </p:sp>
+      <p:sp>
+        <p:nvSpPr>
+          <p:cNvPr id="4" name="Slide Number Placeholder 3"/>
+          <p:cNvSpPr>
+            <a:spLocks noGrp="1"/>
+          </p:cNvSpPr>
+          <p:nvPr>
+            <p:ph type="sldNum" sz="quarter" idx="5"/>
+          </p:nvPr>
+        </p:nvSpPr>
+        <p:spPr/>
+        <p:txBody>
+          <a:bodyPr/>
+          <a:lstStyle/>
+          <a:p>
+            <a:fld id="{F9212696-0A7F-9A4B-8E6F-F66892427D89}" type="slidenum">
+              <a:rPr lang="en-US" smtClean="0"/>
+              <a:t>13</a:t>
+            </a:fld>
+            <a:endParaRPr lang="en-US"/>
+          </a:p>
+        </p:txBody>
+      </p:sp>
+    </p:spTree>
+    <p:extLst>
+      <p:ext uri="{BB962C8B-B14F-4D97-AF65-F5344CB8AC3E}">
+        <p14:creationId xmlns:p14="http://schemas.microsoft.com/office/powerpoint/2010/main" val="4219573111"/>
+      </p:ext>
+    </p:extLst>
+  </p:cSld>
+  <p:clrMapOvr>
+    <a:masterClrMapping/>
+  </p:clrMapOvr>
+</p:notes>
+</file>
+
+<file path=ppt/notesSlides/notesSlide14.xml><?xml version="1.0" encoding="utf-8"?>
+<p:notes xmlns:a="http://schemas.openxmlformats.org/drawingml/2006/main" xmlns:r="http://schemas.openxmlformats.org/officeDocument/2006/relationships" xmlns:p="http://schemas.openxmlformats.org/presentationml/2006/main">
+  <p:cSld>
+    <p:spTree>
+      <p:nvGrpSpPr>
+        <p:cNvPr id="1" name=""/>
+        <p:cNvGrpSpPr/>
+        <p:nvPr/>
+      </p:nvGrpSpPr>
+      <p:grpSpPr>
+        <a:xfrm>
+          <a:off x="0" y="0"/>
+          <a:ext cx="0" cy="0"/>
+          <a:chOff x="0" y="0"/>
+          <a:chExt cx="0" cy="0"/>
+        </a:xfrm>
+      </p:grpSpPr>
+      <p:sp>
+        <p:nvSpPr>
+          <p:cNvPr id="2" name="Slide Image Placeholder 1"/>
+          <p:cNvSpPr>
+            <a:spLocks noGrp="1" noRot="1" noChangeAspect="1"/>
+          </p:cNvSpPr>
+          <p:nvPr>
+            <p:ph type="sldImg"/>
+          </p:nvPr>
+        </p:nvSpPr>
+        <p:spPr/>
+      </p:sp>
+      <p:sp>
+        <p:nvSpPr>
+          <p:cNvPr id="3" name="Notes Placeholder 2"/>
+          <p:cNvSpPr>
+            <a:spLocks noGrp="1"/>
+          </p:cNvSpPr>
+          <p:nvPr>
+            <p:ph type="body" idx="1"/>
+          </p:nvPr>
+        </p:nvSpPr>
+        <p:spPr/>
+        <p:txBody>
+          <a:bodyPr/>
+          <a:lstStyle/>
+          <a:p>
+            <a:r>
+              <a:rPr lang="en-US" dirty="0"/>
+              <a:t>Each smaller transformation function was compared and shown equivalent.</a:t>
+            </a:r>
+          </a:p>
+        </p:txBody>
+      </p:sp>
+      <p:sp>
+        <p:nvSpPr>
+          <p:cNvPr id="4" name="Slide Number Placeholder 3"/>
+          <p:cNvSpPr>
+            <a:spLocks noGrp="1"/>
+          </p:cNvSpPr>
+          <p:nvPr>
+            <p:ph type="sldNum" sz="quarter" idx="5"/>
+          </p:nvPr>
+        </p:nvSpPr>
+        <p:spPr/>
+        <p:txBody>
+          <a:bodyPr/>
+          <a:lstStyle/>
+          <a:p>
+            <a:fld id="{F9212696-0A7F-9A4B-8E6F-F66892427D89}" type="slidenum">
+              <a:rPr lang="en-US" smtClean="0"/>
+              <a:t>14</a:t>
+            </a:fld>
+            <a:endParaRPr lang="en-US"/>
+          </a:p>
+        </p:txBody>
+      </p:sp>
+    </p:spTree>
+    <p:extLst>
+      <p:ext uri="{BB962C8B-B14F-4D97-AF65-F5344CB8AC3E}">
+        <p14:creationId xmlns:p14="http://schemas.microsoft.com/office/powerpoint/2010/main" val="4238549404"/>
+      </p:ext>
+    </p:extLst>
+  </p:cSld>
+  <p:clrMapOvr>
+    <a:masterClrMapping/>
+  </p:clrMapOvr>
+</p:notes>
+</file>
+
+<file path=ppt/notesSlides/notesSlide15.xml><?xml version="1.0" encoding="utf-8"?>
+<p:notes xmlns:a="http://schemas.openxmlformats.org/drawingml/2006/main" xmlns:r="http://schemas.openxmlformats.org/officeDocument/2006/relationships" xmlns:p="http://schemas.openxmlformats.org/presentationml/2006/main">
+  <p:cSld>
+    <p:spTree>
+      <p:nvGrpSpPr>
+        <p:cNvPr id="1" name=""/>
+        <p:cNvGrpSpPr/>
+        <p:nvPr/>
+      </p:nvGrpSpPr>
+      <p:grpSpPr>
+        <a:xfrm>
+          <a:off x="0" y="0"/>
+          <a:ext cx="0" cy="0"/>
+          <a:chOff x="0" y="0"/>
+          <a:chExt cx="0" cy="0"/>
+        </a:xfrm>
+      </p:grpSpPr>
+      <p:sp>
+        <p:nvSpPr>
+          <p:cNvPr id="2" name="Slide Image Placeholder 1"/>
+          <p:cNvSpPr>
+            <a:spLocks noGrp="1" noRot="1" noChangeAspect="1"/>
+          </p:cNvSpPr>
+          <p:nvPr>
+            <p:ph type="sldImg"/>
+          </p:nvPr>
+        </p:nvSpPr>
+        <p:spPr/>
+      </p:sp>
+      <p:sp>
+        <p:nvSpPr>
+          <p:cNvPr id="3" name="Notes Placeholder 2"/>
+          <p:cNvSpPr>
+            <a:spLocks noGrp="1"/>
+          </p:cNvSpPr>
+          <p:nvPr>
+            <p:ph type="body" idx="1"/>
+          </p:nvPr>
+        </p:nvSpPr>
+        <p:spPr/>
+        <p:txBody>
+          <a:bodyPr/>
+          <a:lstStyle/>
+          <a:p>
+            <a:r>
+              <a:rPr lang="en-US" dirty="0"/>
+              <a:t>Through SAW overrides, we lessened the complexity of the generated computational models.</a:t>
+            </a:r>
+          </a:p>
+          <a:p>
+            <a:r>
+              <a:rPr lang="en-US" dirty="0"/>
+              <a:t>This allowed the solver to complete within a reasonable time.</a:t>
+            </a:r>
+          </a:p>
+        </p:txBody>
+      </p:sp>
+      <p:sp>
+        <p:nvSpPr>
+          <p:cNvPr id="4" name="Slide Number Placeholder 3"/>
+          <p:cNvSpPr>
+            <a:spLocks noGrp="1"/>
+          </p:cNvSpPr>
+          <p:nvPr>
+            <p:ph type="sldNum" sz="quarter" idx="5"/>
+          </p:nvPr>
+        </p:nvSpPr>
+        <p:spPr/>
+        <p:txBody>
+          <a:bodyPr/>
+          <a:lstStyle/>
+          <a:p>
+            <a:fld id="{F9212696-0A7F-9A4B-8E6F-F66892427D89}" type="slidenum">
+              <a:rPr lang="en-US" smtClean="0"/>
+              <a:t>15</a:t>
+            </a:fld>
+            <a:endParaRPr lang="en-US"/>
+          </a:p>
+        </p:txBody>
+      </p:sp>
+    </p:spTree>
+    <p:extLst>
+      <p:ext uri="{BB962C8B-B14F-4D97-AF65-F5344CB8AC3E}">
+        <p14:creationId xmlns:p14="http://schemas.microsoft.com/office/powerpoint/2010/main" val="536158739"/>
       </p:ext>
     </p:extLst>
   </p:cSld>
@@ -606,7 +1301,24 @@
           <a:bodyPr/>
           <a:lstStyle/>
           <a:p>
-            <a:endParaRPr lang="en-US" dirty="0"/>
+            <a:r>
+              <a:rPr lang="en-US" dirty="0"/>
+              <a:t>What is </a:t>
+            </a:r>
+            <a:r>
+              <a:rPr lang="en-US" dirty="0" err="1"/>
+              <a:t>cryptol</a:t>
+            </a:r>
+            <a:r>
+              <a:rPr lang="en-US" dirty="0"/>
+              <a:t>?</a:t>
+            </a:r>
+          </a:p>
+          <a:p>
+            <a:r>
+              <a:rPr lang="en-US" dirty="0"/>
+              <a:t>What is SAW?</a:t>
+            </a:r>
           </a:p>
         </p:txBody>
       </p:sp>
@@ -627,7 +1339,7 @@
           <a:p>
             <a:fld id="{F9212696-0A7F-9A4B-8E6F-F66892427D89}" type="slidenum">
               <a:rPr lang="en-US" smtClean="0"/>
-              <a:t>3</a:t>
+              <a:t>2</a:t>
             </a:fld>
             <a:endParaRPr lang="en-US"/>
           </a:p>
@@ -636,7 +1348,7 @@
     </p:spTree>
     <p:extLst>
       <p:ext uri="{BB962C8B-B14F-4D97-AF65-F5344CB8AC3E}">
-        <p14:creationId xmlns:p14="http://schemas.microsoft.com/office/powerpoint/2010/main" val="14635794"/>
+        <p14:creationId xmlns:p14="http://schemas.microsoft.com/office/powerpoint/2010/main" val="1844282506"/>
       </p:ext>
     </p:extLst>
   </p:cSld>
@@ -692,74 +1404,17 @@
           <a:p>
             <a:r>
               <a:rPr lang="en-US" dirty="0"/>
-              <a:t>SHA-2 is a compression based algorithm.</a:t>
+              <a:t>Galois used SAW to prove HMAC and other crypto structures to be correct.</a:t>
             </a:r>
           </a:p>
           <a:p>
             <a:r>
               <a:rPr lang="en-US" dirty="0"/>
-              <a:t>It is not modular, so it had to be decomposed to be proved out in SAW.</a:t>
-            </a:r>
-          </a:p>
-          <a:p>
-            <a:r>
-              <a:rPr lang="en-US" dirty="0"/>
-              <a:t>Each decomposed piece shown equivalent to a </a:t>
-            </a:r>
-            <a:r>
-              <a:rPr lang="en-US" dirty="0" err="1"/>
-              <a:t>Cryptol</a:t>
-            </a:r>
-            <a:r>
-              <a:rPr lang="en-US" dirty="0"/>
-              <a:t> specification.</a:t>
-            </a:r>
-          </a:p>
-          <a:p>
-            <a:r>
-              <a:rPr lang="en-US" dirty="0"/>
-              <a:t>Use overrides to replace decomposed piece with the </a:t>
-            </a:r>
-            <a:r>
-              <a:rPr lang="en-US" dirty="0" err="1"/>
-              <a:t>Cryptol</a:t>
-            </a:r>
-            <a:r>
-              <a:rPr lang="en-US" dirty="0"/>
-              <a:t>.</a:t>
-            </a:r>
-          </a:p>
-          <a:p>
-            <a:r>
-              <a:rPr lang="en-US" dirty="0"/>
-              <a:t>Reduced the complexity of the proof of equivalence to a </a:t>
-            </a:r>
-            <a:r>
-              <a:rPr lang="en-US" dirty="0" err="1"/>
-              <a:t>Cryptol</a:t>
-            </a:r>
-            <a:r>
-              <a:rPr lang="en-US" dirty="0"/>
-              <a:t> specification for SHA-2.</a:t>
-            </a:r>
-          </a:p>
-          <a:p>
-            <a:endParaRPr lang="en-US" dirty="0"/>
-          </a:p>
-          <a:p>
-            <a:r>
-              <a:rPr lang="en-US" dirty="0"/>
-              <a:t>What about SHA-2.</a:t>
-            </a:r>
-          </a:p>
-          <a:p>
-            <a:r>
-              <a:rPr lang="en-US" dirty="0"/>
-              <a:t>The sponge construction is inherently more modular so it should lend itself better to SAW---no need for a </a:t>
+              <a:t>The HMAC proof assumes correctness of the </a:t>
             </a:r>
             <a:r>
               <a:rPr lang="en-US"/>
-              <a:t>decomposition.</a:t>
+              <a:t>SHA2 algorithm</a:t>
             </a:r>
             <a:endParaRPr lang="en-US" dirty="0"/>
           </a:p>
@@ -782,7 +1437,7 @@
           <a:p>
             <a:fld id="{F9212696-0A7F-9A4B-8E6F-F66892427D89}" type="slidenum">
               <a:rPr lang="en-US" smtClean="0"/>
-              <a:t>4</a:t>
+              <a:t>3</a:t>
             </a:fld>
             <a:endParaRPr lang="en-US"/>
           </a:p>
@@ -791,7 +1446,7 @@
     </p:spTree>
     <p:extLst>
       <p:ext uri="{BB962C8B-B14F-4D97-AF65-F5344CB8AC3E}">
-        <p14:creationId xmlns:p14="http://schemas.microsoft.com/office/powerpoint/2010/main" val="2947933415"/>
+        <p14:creationId xmlns:p14="http://schemas.microsoft.com/office/powerpoint/2010/main" val="14635794"/>
       </p:ext>
     </p:extLst>
   </p:cSld>
@@ -845,36 +1500,73 @@
           <a:bodyPr/>
           <a:lstStyle/>
           <a:p>
-            <a:pPr marL="0" marR="0" lvl="0" indent="0" algn="l" defTabSz="914400" rtl="0" eaLnBrk="1" fontAlgn="auto" latinLnBrk="0" hangingPunct="1">
-              <a:lnSpc>
-                <a:spcPct val="100000"/>
-              </a:lnSpc>
-              <a:spcBef>
-                <a:spcPts val="0"/>
-              </a:spcBef>
-              <a:spcAft>
-                <a:spcPts val="0"/>
-              </a:spcAft>
-              <a:buClrTx/>
-              <a:buSzTx/>
-              <a:buFontTx/>
-              <a:buNone/>
-              <a:tabLst/>
-              <a:defRPr/>
-            </a:pPr>
-            <a:r>
-              <a:rPr lang="en-US" sz="1200" kern="1200" dirty="0">
-                <a:solidFill>
-                  <a:schemeClr val="tx1"/>
-                </a:solidFill>
-                <a:effectLst/>
-                <a:latin typeface="+mn-lt"/>
-                <a:ea typeface="+mn-ea"/>
-                <a:cs typeface="+mn-cs"/>
-              </a:rPr>
-              <a:t>n ≥ 0 and (d, r) ∈ {(224, 1152) (256, 1088) (384, 832) (512, 576)} </a:t>
-            </a:r>
+            <a:r>
+              <a:rPr lang="en-US" dirty="0"/>
+              <a:t>SHA-2 is a compression-based algorithm.</a:t>
+            </a:r>
+          </a:p>
+          <a:p>
+            <a:r>
+              <a:rPr lang="en-US" dirty="0"/>
+              <a:t>It is not modular, so it had to be decomposed to be proved out in SAW.</a:t>
+            </a:r>
+          </a:p>
+          <a:p>
+            <a:r>
+              <a:rPr lang="en-US" dirty="0"/>
+              <a:t>Each decomposed piece shown equivalent to a </a:t>
+            </a:r>
+            <a:r>
+              <a:rPr lang="en-US" dirty="0" err="1"/>
+              <a:t>Cryptol</a:t>
+            </a:r>
+            <a:r>
+              <a:rPr lang="en-US" dirty="0"/>
+              <a:t> specification.</a:t>
+            </a:r>
+          </a:p>
+          <a:p>
+            <a:r>
+              <a:rPr lang="en-US" dirty="0"/>
+              <a:t>Use overrides to replace decomposed piece with the </a:t>
+            </a:r>
+            <a:r>
+              <a:rPr lang="en-US" dirty="0" err="1"/>
+              <a:t>Cryptol</a:t>
+            </a:r>
+            <a:r>
+              <a:rPr lang="en-US" dirty="0"/>
+              <a:t>.</a:t>
+            </a:r>
+          </a:p>
+          <a:p>
+            <a:r>
+              <a:rPr lang="en-US" dirty="0"/>
+              <a:t>Reduced the complexity of the proof of equivalence to a </a:t>
+            </a:r>
+            <a:r>
+              <a:rPr lang="en-US" dirty="0" err="1"/>
+              <a:t>Cryptol</a:t>
+            </a:r>
+            <a:r>
+              <a:rPr lang="en-US" dirty="0"/>
+              <a:t> specification for SHA-2.</a:t>
+            </a:r>
+          </a:p>
+          <a:p>
             <a:endParaRPr lang="en-US" dirty="0"/>
+          </a:p>
+          <a:p>
+            <a:r>
+              <a:rPr lang="en-US" dirty="0"/>
+              <a:t>What about SHA-2.</a:t>
+            </a:r>
+          </a:p>
+          <a:p>
+            <a:r>
+              <a:rPr lang="en-US" dirty="0"/>
+              <a:t>The sponge construction is inherently more modular so it should lend itself better to SAW---no need for a decomposition.</a:t>
+            </a:r>
           </a:p>
         </p:txBody>
       </p:sp>
@@ -895,7 +1587,7 @@
           <a:p>
             <a:fld id="{F9212696-0A7F-9A4B-8E6F-F66892427D89}" type="slidenum">
               <a:rPr lang="en-US" smtClean="0"/>
-              <a:t>5</a:t>
+              <a:t>4</a:t>
             </a:fld>
             <a:endParaRPr lang="en-US"/>
           </a:p>
@@ -904,7 +1596,7 @@
     </p:spTree>
     <p:extLst>
       <p:ext uri="{BB962C8B-B14F-4D97-AF65-F5344CB8AC3E}">
-        <p14:creationId xmlns:p14="http://schemas.microsoft.com/office/powerpoint/2010/main" val="2911163790"/>
+        <p14:creationId xmlns:p14="http://schemas.microsoft.com/office/powerpoint/2010/main" val="2947933415"/>
       </p:ext>
     </p:extLst>
   </p:cSld>
@@ -958,9 +1650,287 @@
           <a:bodyPr/>
           <a:lstStyle/>
           <a:p>
-            <a:r>
-              <a:rPr lang="en-US" dirty="0"/>
-              <a:t>Sponge construction versus compression-based construction in SHA-2</a:t>
+            <a:pPr marL="0" marR="0" lvl="0" indent="0" algn="l" defTabSz="914400" rtl="0" eaLnBrk="1" fontAlgn="auto" latinLnBrk="0" hangingPunct="1">
+              <a:lnSpc>
+                <a:spcPct val="100000"/>
+              </a:lnSpc>
+              <a:spcBef>
+                <a:spcPts val="0"/>
+              </a:spcBef>
+              <a:spcAft>
+                <a:spcPts val="0"/>
+              </a:spcAft>
+              <a:buClrTx/>
+              <a:buSzTx/>
+              <a:buFontTx/>
+              <a:buNone/>
+              <a:tabLst/>
+              <a:defRPr/>
+            </a:pPr>
+            <a:r>
+              <a:rPr lang="en-US" sz="1200" kern="1200" dirty="0">
+                <a:solidFill>
+                  <a:schemeClr val="tx1"/>
+                </a:solidFill>
+                <a:effectLst/>
+                <a:latin typeface="+mn-lt"/>
+                <a:ea typeface="+mn-ea"/>
+                <a:cs typeface="+mn-cs"/>
+              </a:rPr>
+              <a:t>n ≥ 0 and (d, r) ∈ {(224, 1152) (256, 1088) (384, 832) (512, 576)} </a:t>
+            </a:r>
+          </a:p>
+          <a:p>
+            <a:pPr marL="0" marR="0" lvl="0" indent="0" algn="l" defTabSz="914400" rtl="0" eaLnBrk="1" fontAlgn="auto" latinLnBrk="0" hangingPunct="1">
+              <a:lnSpc>
+                <a:spcPct val="100000"/>
+              </a:lnSpc>
+              <a:spcBef>
+                <a:spcPts val="0"/>
+              </a:spcBef>
+              <a:spcAft>
+                <a:spcPts val="0"/>
+              </a:spcAft>
+              <a:buClrTx/>
+              <a:buSzTx/>
+              <a:buFontTx/>
+              <a:buNone/>
+              <a:tabLst/>
+              <a:defRPr/>
+            </a:pPr>
+            <a:endParaRPr lang="en-US" sz="1200" kern="1200" dirty="0">
+              <a:solidFill>
+                <a:schemeClr val="tx1"/>
+              </a:solidFill>
+              <a:effectLst/>
+              <a:latin typeface="+mn-lt"/>
+              <a:ea typeface="+mn-ea"/>
+              <a:cs typeface="+mn-cs"/>
+            </a:endParaRPr>
+          </a:p>
+          <a:p>
+            <a:pPr marL="0" marR="0" lvl="0" indent="0" algn="l" defTabSz="914400" rtl="0" eaLnBrk="1" fontAlgn="auto" latinLnBrk="0" hangingPunct="1">
+              <a:lnSpc>
+                <a:spcPct val="100000"/>
+              </a:lnSpc>
+              <a:spcBef>
+                <a:spcPts val="0"/>
+              </a:spcBef>
+              <a:spcAft>
+                <a:spcPts val="0"/>
+              </a:spcAft>
+              <a:buClrTx/>
+              <a:buSzTx/>
+              <a:buFontTx/>
+              <a:buNone/>
+              <a:tabLst/>
+              <a:defRPr/>
+            </a:pPr>
+            <a:r>
+              <a:rPr lang="en-US" sz="1200" kern="1200" dirty="0">
+                <a:solidFill>
+                  <a:schemeClr val="tx1"/>
+                </a:solidFill>
+                <a:effectLst/>
+                <a:latin typeface="+mn-lt"/>
+                <a:ea typeface="+mn-ea"/>
+                <a:cs typeface="+mn-cs"/>
+              </a:rPr>
+              <a:t>With d=</a:t>
+            </a:r>
+            <a:r>
+              <a:rPr lang="en-US" sz="1200" kern="1200" dirty="0" err="1">
+                <a:solidFill>
+                  <a:schemeClr val="tx1"/>
+                </a:solidFill>
+                <a:effectLst/>
+                <a:latin typeface="+mn-lt"/>
+                <a:ea typeface="+mn-ea"/>
+                <a:cs typeface="+mn-cs"/>
+              </a:rPr>
+              <a:t>digest_size</a:t>
+            </a:r>
+            <a:r>
+              <a:rPr lang="en-US" sz="1200" kern="1200" dirty="0">
+                <a:solidFill>
+                  <a:schemeClr val="tx1"/>
+                </a:solidFill>
+                <a:effectLst/>
+                <a:latin typeface="+mn-lt"/>
+                <a:ea typeface="+mn-ea"/>
+                <a:cs typeface="+mn-cs"/>
+              </a:rPr>
+              <a:t>, r=rate, n=</a:t>
+            </a:r>
+            <a:r>
+              <a:rPr lang="en-US" sz="1200" kern="1200" dirty="0" err="1">
+                <a:solidFill>
+                  <a:schemeClr val="tx1"/>
+                </a:solidFill>
+                <a:effectLst/>
+                <a:latin typeface="+mn-lt"/>
+                <a:ea typeface="+mn-ea"/>
+                <a:cs typeface="+mn-cs"/>
+              </a:rPr>
+              <a:t>input_size</a:t>
+            </a:r>
+            <a:endParaRPr lang="en-US" sz="1200" kern="1200" dirty="0">
+              <a:solidFill>
+                <a:schemeClr val="tx1"/>
+              </a:solidFill>
+              <a:effectLst/>
+              <a:latin typeface="+mn-lt"/>
+              <a:ea typeface="+mn-ea"/>
+              <a:cs typeface="+mn-cs"/>
+            </a:endParaRPr>
+          </a:p>
+          <a:p>
+            <a:pPr marL="0" marR="0" lvl="0" indent="0" algn="l" defTabSz="914400" rtl="0" eaLnBrk="1" fontAlgn="auto" latinLnBrk="0" hangingPunct="1">
+              <a:lnSpc>
+                <a:spcPct val="100000"/>
+              </a:lnSpc>
+              <a:spcBef>
+                <a:spcPts val="0"/>
+              </a:spcBef>
+              <a:spcAft>
+                <a:spcPts val="0"/>
+              </a:spcAft>
+              <a:buClrTx/>
+              <a:buSzTx/>
+              <a:buFontTx/>
+              <a:buNone/>
+              <a:tabLst/>
+              <a:defRPr/>
+            </a:pPr>
+            <a:r>
+              <a:rPr lang="en-US" sz="1200" kern="1200" dirty="0">
+                <a:solidFill>
+                  <a:schemeClr val="tx1"/>
+                </a:solidFill>
+                <a:effectLst/>
+                <a:latin typeface="+mn-lt"/>
+                <a:ea typeface="+mn-ea"/>
+                <a:cs typeface="+mn-cs"/>
+              </a:rPr>
+              <a:t>VERIFY ^</a:t>
+            </a:r>
+          </a:p>
+          <a:p>
+            <a:pPr marL="0" marR="0" lvl="0" indent="0" algn="l" defTabSz="914400" rtl="0" eaLnBrk="1" fontAlgn="auto" latinLnBrk="0" hangingPunct="1">
+              <a:lnSpc>
+                <a:spcPct val="100000"/>
+              </a:lnSpc>
+              <a:spcBef>
+                <a:spcPts val="0"/>
+              </a:spcBef>
+              <a:spcAft>
+                <a:spcPts val="0"/>
+              </a:spcAft>
+              <a:buClrTx/>
+              <a:buSzTx/>
+              <a:buFontTx/>
+              <a:buNone/>
+              <a:tabLst/>
+              <a:defRPr/>
+            </a:pPr>
+            <a:endParaRPr lang="en-US" sz="1200" kern="1200" dirty="0">
+              <a:solidFill>
+                <a:schemeClr val="tx1"/>
+              </a:solidFill>
+              <a:effectLst/>
+              <a:latin typeface="+mn-lt"/>
+              <a:ea typeface="+mn-ea"/>
+              <a:cs typeface="+mn-cs"/>
+            </a:endParaRPr>
+          </a:p>
+          <a:p>
+            <a:pPr marL="0" marR="0" lvl="0" indent="0" algn="l" defTabSz="914400" rtl="0" eaLnBrk="1" fontAlgn="auto" latinLnBrk="0" hangingPunct="1">
+              <a:lnSpc>
+                <a:spcPct val="100000"/>
+              </a:lnSpc>
+              <a:spcBef>
+                <a:spcPts val="0"/>
+              </a:spcBef>
+              <a:spcAft>
+                <a:spcPts val="0"/>
+              </a:spcAft>
+              <a:buClrTx/>
+              <a:buSzTx/>
+              <a:buFontTx/>
+              <a:buNone/>
+              <a:tabLst/>
+              <a:defRPr/>
+            </a:pPr>
+            <a:r>
+              <a:rPr lang="en-US" sz="1200" kern="1200" dirty="0">
+                <a:solidFill>
+                  <a:schemeClr val="tx1"/>
+                </a:solidFill>
+                <a:effectLst/>
+                <a:latin typeface="+mn-lt"/>
+                <a:ea typeface="+mn-ea"/>
+                <a:cs typeface="+mn-cs"/>
+              </a:rPr>
+              <a:t>SHA3 handles its input differently from its predecessors.</a:t>
+            </a:r>
+          </a:p>
+          <a:p>
+            <a:pPr marL="0" marR="0" lvl="0" indent="0" algn="l" defTabSz="914400" rtl="0" eaLnBrk="1" fontAlgn="auto" latinLnBrk="0" hangingPunct="1">
+              <a:lnSpc>
+                <a:spcPct val="100000"/>
+              </a:lnSpc>
+              <a:spcBef>
+                <a:spcPts val="0"/>
+              </a:spcBef>
+              <a:spcAft>
+                <a:spcPts val="0"/>
+              </a:spcAft>
+              <a:buClrTx/>
+              <a:buSzTx/>
+              <a:buFontTx/>
+              <a:buNone/>
+              <a:tabLst/>
+              <a:defRPr/>
+            </a:pPr>
+            <a:endParaRPr lang="en-US" sz="1200" kern="1200" dirty="0">
+              <a:solidFill>
+                <a:schemeClr val="tx1"/>
+              </a:solidFill>
+              <a:effectLst/>
+              <a:latin typeface="+mn-lt"/>
+              <a:ea typeface="+mn-ea"/>
+              <a:cs typeface="+mn-cs"/>
+            </a:endParaRPr>
+          </a:p>
+          <a:p>
+            <a:pPr marL="0" marR="0" lvl="0" indent="0" algn="l" defTabSz="914400" rtl="0" eaLnBrk="1" fontAlgn="auto" latinLnBrk="0" hangingPunct="1">
+              <a:lnSpc>
+                <a:spcPct val="100000"/>
+              </a:lnSpc>
+              <a:spcBef>
+                <a:spcPts val="0"/>
+              </a:spcBef>
+              <a:spcAft>
+                <a:spcPts val="0"/>
+              </a:spcAft>
+              <a:buClrTx/>
+              <a:buSzTx/>
+              <a:buFontTx/>
+              <a:buNone/>
+              <a:tabLst/>
+              <a:defRPr/>
+            </a:pPr>
+            <a:r>
+              <a:rPr lang="en-US" sz="1200" kern="1200" dirty="0">
+                <a:solidFill>
+                  <a:schemeClr val="tx1"/>
+                </a:solidFill>
+                <a:effectLst/>
+                <a:latin typeface="+mn-lt"/>
+                <a:ea typeface="+mn-ea"/>
+                <a:cs typeface="+mn-cs"/>
+              </a:rPr>
+              <a:t>&lt;Possible description of sponge?&gt;</a:t>
             </a:r>
           </a:p>
         </p:txBody>
@@ -982,7 +1952,7 @@
           <a:p>
             <a:fld id="{F9212696-0A7F-9A4B-8E6F-F66892427D89}" type="slidenum">
               <a:rPr lang="en-US" smtClean="0"/>
-              <a:t>7</a:t>
+              <a:t>5</a:t>
             </a:fld>
             <a:endParaRPr lang="en-US"/>
           </a:p>
@@ -991,7 +1961,7 @@
     </p:spTree>
     <p:extLst>
       <p:ext uri="{BB962C8B-B14F-4D97-AF65-F5344CB8AC3E}">
-        <p14:creationId xmlns:p14="http://schemas.microsoft.com/office/powerpoint/2010/main" val="196083981"/>
+        <p14:creationId xmlns:p14="http://schemas.microsoft.com/office/powerpoint/2010/main" val="2911163790"/>
       </p:ext>
     </p:extLst>
   </p:cSld>
@@ -1045,7 +2015,16 @@
           <a:bodyPr/>
           <a:lstStyle/>
           <a:p>
-            <a:endParaRPr lang="en-US" dirty="0"/>
+            <a:r>
+              <a:rPr lang="en-US" dirty="0"/>
+              <a:t>Keccak consists of five functions.</a:t>
+            </a:r>
+          </a:p>
+          <a:p>
+            <a:r>
+              <a:rPr lang="en-US" dirty="0"/>
+              <a:t>Each function performs an independent state transformation.</a:t>
+            </a:r>
           </a:p>
         </p:txBody>
       </p:sp>
@@ -1066,7 +2045,7 @@
           <a:p>
             <a:fld id="{F9212696-0A7F-9A4B-8E6F-F66892427D89}" type="slidenum">
               <a:rPr lang="en-US" smtClean="0"/>
-              <a:t>8</a:t>
+              <a:t>6</a:t>
             </a:fld>
             <a:endParaRPr lang="en-US"/>
           </a:p>
@@ -1075,7 +2054,7 @@
     </p:spTree>
     <p:extLst>
       <p:ext uri="{BB962C8B-B14F-4D97-AF65-F5344CB8AC3E}">
-        <p14:creationId xmlns:p14="http://schemas.microsoft.com/office/powerpoint/2010/main" val="2796285379"/>
+        <p14:creationId xmlns:p14="http://schemas.microsoft.com/office/powerpoint/2010/main" val="4106580584"/>
       </p:ext>
     </p:extLst>
   </p:cSld>
@@ -1129,7 +2108,19 @@
           <a:bodyPr/>
           <a:lstStyle/>
           <a:p>
+            <a:r>
+              <a:rPr lang="en-US" dirty="0"/>
+              <a:t>Sponge construction versus compression-based construction in SHA-2</a:t>
+            </a:r>
+          </a:p>
+          <a:p>
             <a:endParaRPr lang="en-US" dirty="0"/>
+          </a:p>
+          <a:p>
+            <a:r>
+              <a:rPr lang="en-US" dirty="0"/>
+              <a:t>&lt;What differences should we focus on?&gt;</a:t>
+            </a:r>
           </a:p>
         </p:txBody>
       </p:sp>
@@ -1150,7 +2141,7 @@
           <a:p>
             <a:fld id="{F9212696-0A7F-9A4B-8E6F-F66892427D89}" type="slidenum">
               <a:rPr lang="en-US" smtClean="0"/>
-              <a:t>10</a:t>
+              <a:t>7</a:t>
             </a:fld>
             <a:endParaRPr lang="en-US"/>
           </a:p>
@@ -1159,7 +2150,7 @@
     </p:spTree>
     <p:extLst>
       <p:ext uri="{BB962C8B-B14F-4D97-AF65-F5344CB8AC3E}">
-        <p14:creationId xmlns:p14="http://schemas.microsoft.com/office/powerpoint/2010/main" val="219260823"/>
+        <p14:creationId xmlns:p14="http://schemas.microsoft.com/office/powerpoint/2010/main" val="196083981"/>
       </p:ext>
     </p:extLst>
   </p:cSld>
@@ -1213,7 +2204,16 @@
           <a:bodyPr/>
           <a:lstStyle/>
           <a:p>
-            <a:endParaRPr lang="en-US" dirty="0"/>
+            <a:r>
+              <a:rPr lang="en-US" dirty="0"/>
+              <a:t>Through SAW’s override system and KECCAK’s modular layout, we were able to prove each of the five functions individually.</a:t>
+            </a:r>
+          </a:p>
+          <a:p>
+            <a:r>
+              <a:rPr lang="en-US" dirty="0"/>
+              <a:t>With those resulting contracts we proved the entirety of KECCAK.</a:t>
+            </a:r>
           </a:p>
         </p:txBody>
       </p:sp>
@@ -1234,7 +2234,7 @@
           <a:p>
             <a:fld id="{F9212696-0A7F-9A4B-8E6F-F66892427D89}" type="slidenum">
               <a:rPr lang="en-US" smtClean="0"/>
-              <a:t>11</a:t>
+              <a:t>8</a:t>
             </a:fld>
             <a:endParaRPr lang="en-US"/>
           </a:p>
@@ -1243,7 +2243,7 @@
     </p:spTree>
     <p:extLst>
       <p:ext uri="{BB962C8B-B14F-4D97-AF65-F5344CB8AC3E}">
-        <p14:creationId xmlns:p14="http://schemas.microsoft.com/office/powerpoint/2010/main" val="4142389940"/>
+        <p14:creationId xmlns:p14="http://schemas.microsoft.com/office/powerpoint/2010/main" val="2796285379"/>
       </p:ext>
     </p:extLst>
   </p:cSld>
@@ -1297,7 +2297,30 @@
           <a:bodyPr/>
           <a:lstStyle/>
           <a:p>
-            <a:endParaRPr lang="en-US" dirty="0"/>
+            <a:r>
+              <a:rPr lang="en-US" dirty="0"/>
+              <a:t>Visual inspection with the standard </a:t>
+            </a:r>
+            <a:r>
+              <a:rPr lang="en-US" dirty="0" err="1"/>
+              <a:t>Cryptol</a:t>
+            </a:r>
+            <a:r>
+              <a:rPr lang="en-US" dirty="0"/>
+              <a:t> syntax of list comprehensions was not always intuitive.</a:t>
+            </a:r>
+          </a:p>
+          <a:p>
+            <a:r>
+              <a:rPr lang="en-US" dirty="0"/>
+              <a:t>We constructed higher order functions that hide the less comparable list comprehensions to greatly simplify looping structures such as for and while loops.</a:t>
+            </a:r>
+          </a:p>
+          <a:p>
+            <a:r>
+              <a:rPr lang="en-US" dirty="0"/>
+              <a:t>This led to a more straightforward visual comparison.</a:t>
+            </a:r>
           </a:p>
         </p:txBody>
       </p:sp>
@@ -1318,7 +2341,7 @@
           <a:p>
             <a:fld id="{F9212696-0A7F-9A4B-8E6F-F66892427D89}" type="slidenum">
               <a:rPr lang="en-US" smtClean="0"/>
-              <a:t>12</a:t>
+              <a:t>9</a:t>
             </a:fld>
             <a:endParaRPr lang="en-US"/>
           </a:p>
@@ -1327,7 +2350,7 @@
     </p:spTree>
     <p:extLst>
       <p:ext uri="{BB962C8B-B14F-4D97-AF65-F5344CB8AC3E}">
-        <p14:creationId xmlns:p14="http://schemas.microsoft.com/office/powerpoint/2010/main" val="2212572720"/>
+        <p14:creationId xmlns:p14="http://schemas.microsoft.com/office/powerpoint/2010/main" val="1282549929"/>
       </p:ext>
     </p:extLst>
   </p:cSld>
@@ -1468,7 +2491,7 @@
           <a:p>
             <a:fld id="{F1C7DD81-8C6B-F24B-99BC-64FACD17F553}" type="datetimeFigureOut">
               <a:rPr lang="en-US" smtClean="0"/>
-              <a:t>5/18/22</a:t>
+              <a:t>5/18/2022</a:t>
             </a:fld>
             <a:endParaRPr lang="en-US"/>
           </a:p>
@@ -1638,7 +2661,7 @@
           <a:p>
             <a:fld id="{F1C7DD81-8C6B-F24B-99BC-64FACD17F553}" type="datetimeFigureOut">
               <a:rPr lang="en-US" smtClean="0"/>
-              <a:t>5/18/22</a:t>
+              <a:t>5/18/2022</a:t>
             </a:fld>
             <a:endParaRPr lang="en-US"/>
           </a:p>
@@ -1818,7 +2841,7 @@
           <a:p>
             <a:fld id="{F1C7DD81-8C6B-F24B-99BC-64FACD17F553}" type="datetimeFigureOut">
               <a:rPr lang="en-US" smtClean="0"/>
-              <a:t>5/18/22</a:t>
+              <a:t>5/18/2022</a:t>
             </a:fld>
             <a:endParaRPr lang="en-US"/>
           </a:p>
@@ -1988,7 +3011,7 @@
           <a:p>
             <a:fld id="{F1C7DD81-8C6B-F24B-99BC-64FACD17F553}" type="datetimeFigureOut">
               <a:rPr lang="en-US" smtClean="0"/>
-              <a:t>5/18/22</a:t>
+              <a:t>5/18/2022</a:t>
             </a:fld>
             <a:endParaRPr lang="en-US"/>
           </a:p>
@@ -2234,7 +3257,7 @@
           <a:p>
             <a:fld id="{F1C7DD81-8C6B-F24B-99BC-64FACD17F553}" type="datetimeFigureOut">
               <a:rPr lang="en-US" smtClean="0"/>
-              <a:t>5/18/22</a:t>
+              <a:t>5/18/2022</a:t>
             </a:fld>
             <a:endParaRPr lang="en-US"/>
           </a:p>
@@ -2466,7 +3489,7 @@
           <a:p>
             <a:fld id="{F1C7DD81-8C6B-F24B-99BC-64FACD17F553}" type="datetimeFigureOut">
               <a:rPr lang="en-US" smtClean="0"/>
-              <a:t>5/18/22</a:t>
+              <a:t>5/18/2022</a:t>
             </a:fld>
             <a:endParaRPr lang="en-US"/>
           </a:p>
@@ -2833,7 +3856,7 @@
           <a:p>
             <a:fld id="{F1C7DD81-8C6B-F24B-99BC-64FACD17F553}" type="datetimeFigureOut">
               <a:rPr lang="en-US" smtClean="0"/>
-              <a:t>5/18/22</a:t>
+              <a:t>5/18/2022</a:t>
             </a:fld>
             <a:endParaRPr lang="en-US"/>
           </a:p>
@@ -2951,7 +3974,7 @@
           <a:p>
             <a:fld id="{F1C7DD81-8C6B-F24B-99BC-64FACD17F553}" type="datetimeFigureOut">
               <a:rPr lang="en-US" smtClean="0"/>
-              <a:t>5/18/22</a:t>
+              <a:t>5/18/2022</a:t>
             </a:fld>
             <a:endParaRPr lang="en-US"/>
           </a:p>
@@ -3046,7 +4069,7 @@
           <a:p>
             <a:fld id="{F1C7DD81-8C6B-F24B-99BC-64FACD17F553}" type="datetimeFigureOut">
               <a:rPr lang="en-US" smtClean="0"/>
-              <a:t>5/18/22</a:t>
+              <a:t>5/18/2022</a:t>
             </a:fld>
             <a:endParaRPr lang="en-US"/>
           </a:p>
@@ -3323,7 +4346,7 @@
           <a:p>
             <a:fld id="{F1C7DD81-8C6B-F24B-99BC-64FACD17F553}" type="datetimeFigureOut">
               <a:rPr lang="en-US" smtClean="0"/>
-              <a:t>5/18/22</a:t>
+              <a:t>5/18/2022</a:t>
             </a:fld>
             <a:endParaRPr lang="en-US"/>
           </a:p>
@@ -3580,7 +4603,7 @@
           <a:p>
             <a:fld id="{F1C7DD81-8C6B-F24B-99BC-64FACD17F553}" type="datetimeFigureOut">
               <a:rPr lang="en-US" smtClean="0"/>
-              <a:t>5/18/22</a:t>
+              <a:t>5/18/2022</a:t>
             </a:fld>
             <a:endParaRPr lang="en-US"/>
           </a:p>
@@ -3793,7 +4816,7 @@
           <a:p>
             <a:fld id="{F1C7DD81-8C6B-F24B-99BC-64FACD17F553}" type="datetimeFigureOut">
               <a:rPr lang="en-US" smtClean="0"/>
-              <a:t>5/18/22</a:t>
+              <a:t>5/18/2022</a:t>
             </a:fld>
             <a:endParaRPr lang="en-US"/>
           </a:p>
@@ -7162,6 +8185,11 @@
       <p:bldP spid="21" grpId="1"/>
     </p:bldLst>
   </p:timing>
+  <p:extLst>
+    <p:ext uri="{6950BFC3-D8DA-4A85-94F7-54DA5524770B}">
+      <p188:commentRel xmlns:p188="http://schemas.microsoft.com/office/powerpoint/2018/8/main" r:id="rId3"/>
+    </p:ext>
+  </p:extLst>
 </p:sld>
 </file>
 
@@ -7304,8 +8332,8 @@
             </a:p>
           </p:txBody>
         </p:sp>
-        <mc:AlternateContent xmlns:mc="http://schemas.openxmlformats.org/markup-compatibility/2006">
-          <mc:Choice xmlns:a14="http://schemas.microsoft.com/office/drawing/2010/main" Requires="a14">
+        <mc:AlternateContent xmlns:mc="http://schemas.openxmlformats.org/markup-compatibility/2006" xmlns:a14="http://schemas.microsoft.com/office/drawing/2010/main">
+          <mc:Choice Requires="a14">
             <p:sp>
               <p:nvSpPr>
                 <p:cNvPr id="6" name="Rounded Rectangle 5">
@@ -7381,7 +8409,7 @@
               </p:txBody>
             </p:sp>
           </mc:Choice>
-          <mc:Fallback>
+          <mc:Fallback xmlns="">
             <p:sp>
               <p:nvSpPr>
                 <p:cNvPr id="6" name="Rounded Rectangle 5">
@@ -7405,7 +8433,7 @@
                   <a:avLst/>
                 </a:prstGeom>
                 <a:blipFill>
-                  <a:blip r:embed="rId2"/>
+                  <a:blip r:embed="rId3"/>
                   <a:stretch>
                     <a:fillRect l="-12195" b="-22222"/>
                   </a:stretch>
@@ -7431,8 +8459,8 @@
             </p:sp>
           </mc:Fallback>
         </mc:AlternateContent>
-        <mc:AlternateContent xmlns:mc="http://schemas.openxmlformats.org/markup-compatibility/2006">
-          <mc:Choice xmlns:a14="http://schemas.microsoft.com/office/drawing/2010/main" Requires="a14">
+        <mc:AlternateContent xmlns:mc="http://schemas.openxmlformats.org/markup-compatibility/2006" xmlns:a14="http://schemas.microsoft.com/office/drawing/2010/main">
+          <mc:Choice Requires="a14">
             <p:sp>
               <p:nvSpPr>
                 <p:cNvPr id="7" name="Rounded Rectangle 6">
@@ -7508,7 +8536,7 @@
               </p:txBody>
             </p:sp>
           </mc:Choice>
-          <mc:Fallback>
+          <mc:Fallback xmlns="">
             <p:sp>
               <p:nvSpPr>
                 <p:cNvPr id="7" name="Rounded Rectangle 6">
@@ -7532,7 +8560,7 @@
                   <a:avLst/>
                 </a:prstGeom>
                 <a:blipFill>
-                  <a:blip r:embed="rId3"/>
+                  <a:blip r:embed="rId4"/>
                   <a:stretch>
                     <a:fillRect l="-9756" b="-21622"/>
                   </a:stretch>
@@ -7558,8 +8586,8 @@
             </p:sp>
           </mc:Fallback>
         </mc:AlternateContent>
-        <mc:AlternateContent xmlns:mc="http://schemas.openxmlformats.org/markup-compatibility/2006">
-          <mc:Choice xmlns:a14="http://schemas.microsoft.com/office/drawing/2010/main" Requires="a14">
+        <mc:AlternateContent xmlns:mc="http://schemas.openxmlformats.org/markup-compatibility/2006" xmlns:a14="http://schemas.microsoft.com/office/drawing/2010/main">
+          <mc:Choice Requires="a14">
             <p:sp>
               <p:nvSpPr>
                 <p:cNvPr id="8" name="Rounded Rectangle 7">
@@ -7635,7 +8663,7 @@
               </p:txBody>
             </p:sp>
           </mc:Choice>
-          <mc:Fallback>
+          <mc:Fallback xmlns="">
             <p:sp>
               <p:nvSpPr>
                 <p:cNvPr id="8" name="Rounded Rectangle 7">
@@ -7659,7 +8687,7 @@
                   <a:avLst/>
                 </a:prstGeom>
                 <a:blipFill>
-                  <a:blip r:embed="rId4"/>
+                  <a:blip r:embed="rId5"/>
                   <a:stretch>
                     <a:fillRect l="-12195" b="-22222"/>
                   </a:stretch>
@@ -7685,8 +8713,8 @@
             </p:sp>
           </mc:Fallback>
         </mc:AlternateContent>
-        <mc:AlternateContent xmlns:mc="http://schemas.openxmlformats.org/markup-compatibility/2006">
-          <mc:Choice xmlns:a14="http://schemas.microsoft.com/office/drawing/2010/main" Requires="a14">
+        <mc:AlternateContent xmlns:mc="http://schemas.openxmlformats.org/markup-compatibility/2006" xmlns:a14="http://schemas.microsoft.com/office/drawing/2010/main">
+          <mc:Choice Requires="a14">
             <p:sp>
               <p:nvSpPr>
                 <p:cNvPr id="9" name="Rounded Rectangle 8">
@@ -7762,7 +8790,7 @@
               </p:txBody>
             </p:sp>
           </mc:Choice>
-          <mc:Fallback>
+          <mc:Fallback xmlns="">
             <p:sp>
               <p:nvSpPr>
                 <p:cNvPr id="9" name="Rounded Rectangle 8">
@@ -7786,7 +8814,7 @@
                   <a:avLst/>
                 </a:prstGeom>
                 <a:blipFill>
-                  <a:blip r:embed="rId5"/>
+                  <a:blip r:embed="rId6"/>
                   <a:stretch>
                     <a:fillRect l="-12500" b="-22222"/>
                   </a:stretch>
@@ -7812,8 +8840,8 @@
             </p:sp>
           </mc:Fallback>
         </mc:AlternateContent>
-        <mc:AlternateContent xmlns:mc="http://schemas.openxmlformats.org/markup-compatibility/2006">
-          <mc:Choice xmlns:a14="http://schemas.microsoft.com/office/drawing/2010/main" Requires="a14">
+        <mc:AlternateContent xmlns:mc="http://schemas.openxmlformats.org/markup-compatibility/2006" xmlns:a14="http://schemas.microsoft.com/office/drawing/2010/main">
+          <mc:Choice Requires="a14">
             <p:sp>
               <p:nvSpPr>
                 <p:cNvPr id="10" name="Rounded Rectangle 9">
@@ -7883,7 +8911,7 @@
               </p:txBody>
             </p:sp>
           </mc:Choice>
-          <mc:Fallback>
+          <mc:Fallback xmlns="">
             <p:sp>
               <p:nvSpPr>
                 <p:cNvPr id="10" name="Rounded Rectangle 9">
@@ -7907,7 +8935,7 @@
                   <a:avLst/>
                 </a:prstGeom>
                 <a:blipFill>
-                  <a:blip r:embed="rId6"/>
+                  <a:blip r:embed="rId7"/>
                   <a:stretch>
                     <a:fillRect/>
                   </a:stretch>
@@ -8018,8 +9046,8 @@
             </a:p>
           </p:txBody>
         </p:sp>
-        <mc:AlternateContent xmlns:mc="http://schemas.openxmlformats.org/markup-compatibility/2006">
-          <mc:Choice xmlns:a14="http://schemas.microsoft.com/office/drawing/2010/main" Requires="a14">
+        <mc:AlternateContent xmlns:mc="http://schemas.openxmlformats.org/markup-compatibility/2006" xmlns:a14="http://schemas.microsoft.com/office/drawing/2010/main">
+          <mc:Choice Requires="a14">
             <p:sp>
               <p:nvSpPr>
                 <p:cNvPr id="11" name="Rounded Rectangle 10">
@@ -8098,7 +9126,7 @@
               </p:txBody>
             </p:sp>
           </mc:Choice>
-          <mc:Fallback>
+          <mc:Fallback xmlns="">
             <p:sp>
               <p:nvSpPr>
                 <p:cNvPr id="11" name="Rounded Rectangle 10">
@@ -8122,7 +9150,7 @@
                   <a:avLst/>
                 </a:prstGeom>
                 <a:blipFill>
-                  <a:blip r:embed="rId7"/>
+                  <a:blip r:embed="rId8"/>
                   <a:stretch>
                     <a:fillRect l="-15000" b="-21622"/>
                   </a:stretch>
@@ -8148,8 +9176,8 @@
             </p:sp>
           </mc:Fallback>
         </mc:AlternateContent>
-        <mc:AlternateContent xmlns:mc="http://schemas.openxmlformats.org/markup-compatibility/2006">
-          <mc:Choice xmlns:a14="http://schemas.microsoft.com/office/drawing/2010/main" Requires="a14">
+        <mc:AlternateContent xmlns:mc="http://schemas.openxmlformats.org/markup-compatibility/2006" xmlns:a14="http://schemas.microsoft.com/office/drawing/2010/main">
+          <mc:Choice Requires="a14">
             <p:sp>
               <p:nvSpPr>
                 <p:cNvPr id="12" name="Rounded Rectangle 11">
@@ -8228,7 +9256,7 @@
               </p:txBody>
             </p:sp>
           </mc:Choice>
-          <mc:Fallback>
+          <mc:Fallback xmlns="">
             <p:sp>
               <p:nvSpPr>
                 <p:cNvPr id="12" name="Rounded Rectangle 11">
@@ -8252,7 +9280,7 @@
                   <a:avLst/>
                 </a:prstGeom>
                 <a:blipFill>
-                  <a:blip r:embed="rId8"/>
+                  <a:blip r:embed="rId9"/>
                   <a:stretch>
                     <a:fillRect l="-9756" b="-25000"/>
                   </a:stretch>
@@ -8278,8 +9306,8 @@
             </p:sp>
           </mc:Fallback>
         </mc:AlternateContent>
-        <mc:AlternateContent xmlns:mc="http://schemas.openxmlformats.org/markup-compatibility/2006">
-          <mc:Choice xmlns:a14="http://schemas.microsoft.com/office/drawing/2010/main" Requires="a14">
+        <mc:AlternateContent xmlns:mc="http://schemas.openxmlformats.org/markup-compatibility/2006" xmlns:a14="http://schemas.microsoft.com/office/drawing/2010/main">
+          <mc:Choice Requires="a14">
             <p:sp>
               <p:nvSpPr>
                 <p:cNvPr id="13" name="Rounded Rectangle 12">
@@ -8358,7 +9386,7 @@
               </p:txBody>
             </p:sp>
           </mc:Choice>
-          <mc:Fallback>
+          <mc:Fallback xmlns="">
             <p:sp>
               <p:nvSpPr>
                 <p:cNvPr id="13" name="Rounded Rectangle 12">
@@ -8382,7 +9410,7 @@
                   <a:avLst/>
                 </a:prstGeom>
                 <a:blipFill>
-                  <a:blip r:embed="rId9"/>
+                  <a:blip r:embed="rId10"/>
                   <a:stretch>
                     <a:fillRect l="-15000" b="-21622"/>
                   </a:stretch>
@@ -8408,8 +9436,8 @@
             </p:sp>
           </mc:Fallback>
         </mc:AlternateContent>
-        <mc:AlternateContent xmlns:mc="http://schemas.openxmlformats.org/markup-compatibility/2006">
-          <mc:Choice xmlns:a14="http://schemas.microsoft.com/office/drawing/2010/main" Requires="a14">
+        <mc:AlternateContent xmlns:mc="http://schemas.openxmlformats.org/markup-compatibility/2006" xmlns:a14="http://schemas.microsoft.com/office/drawing/2010/main">
+          <mc:Choice Requires="a14">
             <p:sp>
               <p:nvSpPr>
                 <p:cNvPr id="14" name="Rounded Rectangle 13">
@@ -8488,7 +9516,7 @@
               </p:txBody>
             </p:sp>
           </mc:Choice>
-          <mc:Fallback>
+          <mc:Fallback xmlns="">
             <p:sp>
               <p:nvSpPr>
                 <p:cNvPr id="14" name="Rounded Rectangle 13">
@@ -8512,7 +9540,7 @@
                   <a:avLst/>
                 </a:prstGeom>
                 <a:blipFill>
-                  <a:blip r:embed="rId10"/>
+                  <a:blip r:embed="rId11"/>
                   <a:stretch>
                     <a:fillRect l="-12195" b="-21622"/>
                   </a:stretch>
@@ -8538,8 +9566,8 @@
             </p:sp>
           </mc:Fallback>
         </mc:AlternateContent>
-        <mc:AlternateContent xmlns:mc="http://schemas.openxmlformats.org/markup-compatibility/2006">
-          <mc:Choice xmlns:a14="http://schemas.microsoft.com/office/drawing/2010/main" Requires="a14">
+        <mc:AlternateContent xmlns:mc="http://schemas.openxmlformats.org/markup-compatibility/2006" xmlns:a14="http://schemas.microsoft.com/office/drawing/2010/main">
+          <mc:Choice Requires="a14">
             <p:sp>
               <p:nvSpPr>
                 <p:cNvPr id="15" name="Rounded Rectangle 14">
@@ -8612,7 +9640,7 @@
               </p:txBody>
             </p:sp>
           </mc:Choice>
-          <mc:Fallback>
+          <mc:Fallback xmlns="">
             <p:sp>
               <p:nvSpPr>
                 <p:cNvPr id="15" name="Rounded Rectangle 14">
@@ -8636,7 +9664,7 @@
                   <a:avLst/>
                 </a:prstGeom>
                 <a:blipFill>
-                  <a:blip r:embed="rId11"/>
+                  <a:blip r:embed="rId12"/>
                   <a:stretch>
                     <a:fillRect/>
                   </a:stretch>
@@ -8677,8 +9705,8 @@
         </p:nvSpPr>
         <p:spPr>
           <a:xfrm>
-            <a:off x="4493334" y="2765722"/>
-            <a:ext cx="3197416" cy="1200329"/>
+            <a:off x="4491978" y="2583552"/>
+            <a:ext cx="3197416" cy="1754326"/>
           </a:xfrm>
           <a:prstGeom prst="rect">
             <a:avLst/>
@@ -8698,7 +9726,7 @@
                   <a:schemeClr val="accent5"/>
                 </a:solidFill>
               </a:rPr>
-              <a:t>Too big to prove equivalent</a:t>
+              <a:t>Too complex to prove equivalent</a:t>
             </a:r>
           </a:p>
         </p:txBody>
@@ -8839,8 +9867,8 @@
           </a:p>
         </p:txBody>
       </p:sp>
-      <mc:AlternateContent xmlns:mc="http://schemas.openxmlformats.org/markup-compatibility/2006">
-        <mc:Choice xmlns:a14="http://schemas.microsoft.com/office/drawing/2010/main" Requires="a14">
+      <mc:AlternateContent xmlns:mc="http://schemas.openxmlformats.org/markup-compatibility/2006" xmlns:a14="http://schemas.microsoft.com/office/drawing/2010/main">
+        <mc:Choice Requires="a14">
           <p:sp>
             <p:nvSpPr>
               <p:cNvPr id="3" name="Rounded Rectangle 2">
@@ -8911,7 +9939,7 @@
             </p:txBody>
           </p:sp>
         </mc:Choice>
-        <mc:Fallback>
+        <mc:Fallback xmlns="">
           <p:sp>
             <p:nvSpPr>
               <p:cNvPr id="3" name="Rounded Rectangle 2">
@@ -8935,7 +9963,7 @@
                 <a:avLst/>
               </a:prstGeom>
               <a:blipFill>
-                <a:blip r:embed="rId2"/>
+                <a:blip r:embed="rId3"/>
                 <a:stretch>
                   <a:fillRect b="-14754"/>
                 </a:stretch>
@@ -8956,8 +9984,8 @@
           </p:sp>
         </mc:Fallback>
       </mc:AlternateContent>
-      <mc:AlternateContent xmlns:mc="http://schemas.openxmlformats.org/markup-compatibility/2006">
-        <mc:Choice xmlns:a14="http://schemas.microsoft.com/office/drawing/2010/main" Requires="a14">
+      <mc:AlternateContent xmlns:mc="http://schemas.openxmlformats.org/markup-compatibility/2006" xmlns:a14="http://schemas.microsoft.com/office/drawing/2010/main">
+        <mc:Choice Requires="a14">
           <p:sp>
             <p:nvSpPr>
               <p:cNvPr id="4" name="Rounded Rectangle 3">
@@ -9028,7 +10056,7 @@
             </p:txBody>
           </p:sp>
         </mc:Choice>
-        <mc:Fallback>
+        <mc:Fallback xmlns="">
           <p:sp>
             <p:nvSpPr>
               <p:cNvPr id="4" name="Rounded Rectangle 3">
@@ -9052,7 +10080,7 @@
                 <a:avLst/>
               </a:prstGeom>
               <a:blipFill>
-                <a:blip r:embed="rId3"/>
+                <a:blip r:embed="rId4"/>
                 <a:stretch>
                   <a:fillRect b="-14754"/>
                 </a:stretch>
@@ -9073,8 +10101,8 @@
           </p:sp>
         </mc:Fallback>
       </mc:AlternateContent>
-      <mc:AlternateContent xmlns:mc="http://schemas.openxmlformats.org/markup-compatibility/2006">
-        <mc:Choice xmlns:a14="http://schemas.microsoft.com/office/drawing/2010/main" Requires="a14">
+      <mc:AlternateContent xmlns:mc="http://schemas.openxmlformats.org/markup-compatibility/2006" xmlns:a14="http://schemas.microsoft.com/office/drawing/2010/main">
+        <mc:Choice Requires="a14">
           <p:sp>
             <p:nvSpPr>
               <p:cNvPr id="5" name="Rounded Rectangle 4">
@@ -9145,7 +10173,7 @@
             </p:txBody>
           </p:sp>
         </mc:Choice>
-        <mc:Fallback>
+        <mc:Fallback xmlns="">
           <p:sp>
             <p:nvSpPr>
               <p:cNvPr id="5" name="Rounded Rectangle 4">
@@ -9169,7 +10197,7 @@
                 <a:avLst/>
               </a:prstGeom>
               <a:blipFill>
-                <a:blip r:embed="rId4"/>
+                <a:blip r:embed="rId5"/>
                 <a:stretch>
                   <a:fillRect b="-14754"/>
                 </a:stretch>
@@ -9190,8 +10218,8 @@
           </p:sp>
         </mc:Fallback>
       </mc:AlternateContent>
-      <mc:AlternateContent xmlns:mc="http://schemas.openxmlformats.org/markup-compatibility/2006">
-        <mc:Choice xmlns:a14="http://schemas.microsoft.com/office/drawing/2010/main" Requires="a14">
+      <mc:AlternateContent xmlns:mc="http://schemas.openxmlformats.org/markup-compatibility/2006" xmlns:a14="http://schemas.microsoft.com/office/drawing/2010/main">
+        <mc:Choice Requires="a14">
           <p:sp>
             <p:nvSpPr>
               <p:cNvPr id="6" name="Rounded Rectangle 5">
@@ -9262,7 +10290,7 @@
             </p:txBody>
           </p:sp>
         </mc:Choice>
-        <mc:Fallback>
+        <mc:Fallback xmlns="">
           <p:sp>
             <p:nvSpPr>
               <p:cNvPr id="6" name="Rounded Rectangle 5">
@@ -9286,7 +10314,7 @@
                 <a:avLst/>
               </a:prstGeom>
               <a:blipFill>
-                <a:blip r:embed="rId5"/>
+                <a:blip r:embed="rId6"/>
                 <a:stretch>
                   <a:fillRect b="-14754"/>
                 </a:stretch>
@@ -9307,8 +10335,8 @@
           </p:sp>
         </mc:Fallback>
       </mc:AlternateContent>
-      <mc:AlternateContent xmlns:mc="http://schemas.openxmlformats.org/markup-compatibility/2006">
-        <mc:Choice xmlns:a14="http://schemas.microsoft.com/office/drawing/2010/main" Requires="a14">
+      <mc:AlternateContent xmlns:mc="http://schemas.openxmlformats.org/markup-compatibility/2006" xmlns:a14="http://schemas.microsoft.com/office/drawing/2010/main">
+        <mc:Choice Requires="a14">
           <p:sp>
             <p:nvSpPr>
               <p:cNvPr id="7" name="Rounded Rectangle 6">
@@ -9373,7 +10401,7 @@
             </p:txBody>
           </p:sp>
         </mc:Choice>
-        <mc:Fallback>
+        <mc:Fallback xmlns="">
           <p:sp>
             <p:nvSpPr>
               <p:cNvPr id="7" name="Rounded Rectangle 6">
@@ -9397,7 +10425,7 @@
                 <a:avLst/>
               </a:prstGeom>
               <a:blipFill>
-                <a:blip r:embed="rId6"/>
+                <a:blip r:embed="rId7"/>
                 <a:stretch>
                   <a:fillRect/>
                 </a:stretch>
@@ -9418,8 +10446,8 @@
           </p:sp>
         </mc:Fallback>
       </mc:AlternateContent>
-      <mc:AlternateContent xmlns:mc="http://schemas.openxmlformats.org/markup-compatibility/2006">
-        <mc:Choice xmlns:a14="http://schemas.microsoft.com/office/drawing/2010/main" Requires="a14">
+      <mc:AlternateContent xmlns:mc="http://schemas.openxmlformats.org/markup-compatibility/2006" xmlns:a14="http://schemas.microsoft.com/office/drawing/2010/main">
+        <mc:Choice Requires="a14">
           <p:sp>
             <p:nvSpPr>
               <p:cNvPr id="8" name="Rounded Rectangle 7">
@@ -9490,7 +10518,7 @@
             </p:txBody>
           </p:sp>
         </mc:Choice>
-        <mc:Fallback>
+        <mc:Fallback xmlns="">
           <p:sp>
             <p:nvSpPr>
               <p:cNvPr id="8" name="Rounded Rectangle 7">
@@ -9514,7 +10542,7 @@
                 <a:avLst/>
               </a:prstGeom>
               <a:blipFill>
-                <a:blip r:embed="rId7"/>
+                <a:blip r:embed="rId8"/>
                 <a:stretch>
                   <a:fillRect b="-14754"/>
                 </a:stretch>
@@ -9535,8 +10563,8 @@
           </p:sp>
         </mc:Fallback>
       </mc:AlternateContent>
-      <mc:AlternateContent xmlns:mc="http://schemas.openxmlformats.org/markup-compatibility/2006">
-        <mc:Choice xmlns:a14="http://schemas.microsoft.com/office/drawing/2010/main" Requires="a14">
+      <mc:AlternateContent xmlns:mc="http://schemas.openxmlformats.org/markup-compatibility/2006" xmlns:a14="http://schemas.microsoft.com/office/drawing/2010/main">
+        <mc:Choice Requires="a14">
           <p:sp>
             <p:nvSpPr>
               <p:cNvPr id="9" name="Rounded Rectangle 8">
@@ -9607,7 +10635,7 @@
             </p:txBody>
           </p:sp>
         </mc:Choice>
-        <mc:Fallback>
+        <mc:Fallback xmlns="">
           <p:sp>
             <p:nvSpPr>
               <p:cNvPr id="9" name="Rounded Rectangle 8">
@@ -9631,7 +10659,7 @@
                 <a:avLst/>
               </a:prstGeom>
               <a:blipFill>
-                <a:blip r:embed="rId8"/>
+                <a:blip r:embed="rId9"/>
                 <a:stretch>
                   <a:fillRect b="-14754"/>
                 </a:stretch>
@@ -9652,8 +10680,8 @@
           </p:sp>
         </mc:Fallback>
       </mc:AlternateContent>
-      <mc:AlternateContent xmlns:mc="http://schemas.openxmlformats.org/markup-compatibility/2006">
-        <mc:Choice xmlns:a14="http://schemas.microsoft.com/office/drawing/2010/main" Requires="a14">
+      <mc:AlternateContent xmlns:mc="http://schemas.openxmlformats.org/markup-compatibility/2006" xmlns:a14="http://schemas.microsoft.com/office/drawing/2010/main">
+        <mc:Choice Requires="a14">
           <p:sp>
             <p:nvSpPr>
               <p:cNvPr id="10" name="Rounded Rectangle 9">
@@ -9724,7 +10752,7 @@
             </p:txBody>
           </p:sp>
         </mc:Choice>
-        <mc:Fallback>
+        <mc:Fallback xmlns="">
           <p:sp>
             <p:nvSpPr>
               <p:cNvPr id="10" name="Rounded Rectangle 9">
@@ -9748,7 +10776,7 @@
                 <a:avLst/>
               </a:prstGeom>
               <a:blipFill>
-                <a:blip r:embed="rId9"/>
+                <a:blip r:embed="rId10"/>
                 <a:stretch>
                   <a:fillRect b="-14754"/>
                 </a:stretch>
@@ -9769,8 +10797,8 @@
           </p:sp>
         </mc:Fallback>
       </mc:AlternateContent>
-      <mc:AlternateContent xmlns:mc="http://schemas.openxmlformats.org/markup-compatibility/2006">
-        <mc:Choice xmlns:a14="http://schemas.microsoft.com/office/drawing/2010/main" Requires="a14">
+      <mc:AlternateContent xmlns:mc="http://schemas.openxmlformats.org/markup-compatibility/2006" xmlns:a14="http://schemas.microsoft.com/office/drawing/2010/main">
+        <mc:Choice Requires="a14">
           <p:sp>
             <p:nvSpPr>
               <p:cNvPr id="11" name="Rounded Rectangle 10">
@@ -9841,7 +10869,7 @@
             </p:txBody>
           </p:sp>
         </mc:Choice>
-        <mc:Fallback>
+        <mc:Fallback xmlns="">
           <p:sp>
             <p:nvSpPr>
               <p:cNvPr id="11" name="Rounded Rectangle 10">
@@ -9865,7 +10893,7 @@
                 <a:avLst/>
               </a:prstGeom>
               <a:blipFill>
-                <a:blip r:embed="rId10"/>
+                <a:blip r:embed="rId11"/>
                 <a:stretch>
                   <a:fillRect b="-14754"/>
                 </a:stretch>
@@ -9886,8 +10914,8 @@
           </p:sp>
         </mc:Fallback>
       </mc:AlternateContent>
-      <mc:AlternateContent xmlns:mc="http://schemas.openxmlformats.org/markup-compatibility/2006">
-        <mc:Choice xmlns:a14="http://schemas.microsoft.com/office/drawing/2010/main" Requires="a14">
+      <mc:AlternateContent xmlns:mc="http://schemas.openxmlformats.org/markup-compatibility/2006" xmlns:a14="http://schemas.microsoft.com/office/drawing/2010/main">
+        <mc:Choice Requires="a14">
           <p:sp>
             <p:nvSpPr>
               <p:cNvPr id="12" name="Rounded Rectangle 11">
@@ -9952,7 +10980,7 @@
             </p:txBody>
           </p:sp>
         </mc:Choice>
-        <mc:Fallback>
+        <mc:Fallback xmlns="">
           <p:sp>
             <p:nvSpPr>
               <p:cNvPr id="12" name="Rounded Rectangle 11">
@@ -9976,7 +11004,7 @@
                 <a:avLst/>
               </a:prstGeom>
               <a:blipFill>
-                <a:blip r:embed="rId11"/>
+                <a:blip r:embed="rId12"/>
                 <a:stretch>
                   <a:fillRect/>
                 </a:stretch>
@@ -10730,8 +11758,8 @@
             </a:p>
           </p:txBody>
         </p:sp>
-        <mc:AlternateContent xmlns:mc="http://schemas.openxmlformats.org/markup-compatibility/2006">
-          <mc:Choice xmlns:a14="http://schemas.microsoft.com/office/drawing/2010/main" Requires="a14">
+        <mc:AlternateContent xmlns:mc="http://schemas.openxmlformats.org/markup-compatibility/2006" xmlns:a14="http://schemas.microsoft.com/office/drawing/2010/main">
+          <mc:Choice Requires="a14">
             <p:sp>
               <p:nvSpPr>
                 <p:cNvPr id="6" name="Rounded Rectangle 5">
@@ -10807,7 +11835,7 @@
               </p:txBody>
             </p:sp>
           </mc:Choice>
-          <mc:Fallback>
+          <mc:Fallback xmlns="">
             <p:sp>
               <p:nvSpPr>
                 <p:cNvPr id="6" name="Rounded Rectangle 5">
@@ -10831,7 +11859,7 @@
                   <a:avLst/>
                 </a:prstGeom>
                 <a:blipFill>
-                  <a:blip r:embed="rId2"/>
+                  <a:blip r:embed="rId3"/>
                   <a:stretch>
                     <a:fillRect l="-12195" b="-22222"/>
                   </a:stretch>
@@ -10857,8 +11885,8 @@
             </p:sp>
           </mc:Fallback>
         </mc:AlternateContent>
-        <mc:AlternateContent xmlns:mc="http://schemas.openxmlformats.org/markup-compatibility/2006">
-          <mc:Choice xmlns:a14="http://schemas.microsoft.com/office/drawing/2010/main" Requires="a14">
+        <mc:AlternateContent xmlns:mc="http://schemas.openxmlformats.org/markup-compatibility/2006" xmlns:a14="http://schemas.microsoft.com/office/drawing/2010/main">
+          <mc:Choice Requires="a14">
             <p:sp>
               <p:nvSpPr>
                 <p:cNvPr id="7" name="Rounded Rectangle 6">
@@ -10934,7 +11962,7 @@
               </p:txBody>
             </p:sp>
           </mc:Choice>
-          <mc:Fallback>
+          <mc:Fallback xmlns="">
             <p:sp>
               <p:nvSpPr>
                 <p:cNvPr id="7" name="Rounded Rectangle 6">
@@ -10958,7 +11986,7 @@
                   <a:avLst/>
                 </a:prstGeom>
                 <a:blipFill>
-                  <a:blip r:embed="rId3"/>
+                  <a:blip r:embed="rId4"/>
                   <a:stretch>
                     <a:fillRect l="-9756" b="-21622"/>
                   </a:stretch>
@@ -10984,8 +12012,8 @@
             </p:sp>
           </mc:Fallback>
         </mc:AlternateContent>
-        <mc:AlternateContent xmlns:mc="http://schemas.openxmlformats.org/markup-compatibility/2006">
-          <mc:Choice xmlns:a14="http://schemas.microsoft.com/office/drawing/2010/main" Requires="a14">
+        <mc:AlternateContent xmlns:mc="http://schemas.openxmlformats.org/markup-compatibility/2006" xmlns:a14="http://schemas.microsoft.com/office/drawing/2010/main">
+          <mc:Choice Requires="a14">
             <p:sp>
               <p:nvSpPr>
                 <p:cNvPr id="8" name="Rounded Rectangle 7">
@@ -11061,7 +12089,7 @@
               </p:txBody>
             </p:sp>
           </mc:Choice>
-          <mc:Fallback>
+          <mc:Fallback xmlns="">
             <p:sp>
               <p:nvSpPr>
                 <p:cNvPr id="8" name="Rounded Rectangle 7">
@@ -11085,7 +12113,7 @@
                   <a:avLst/>
                 </a:prstGeom>
                 <a:blipFill>
-                  <a:blip r:embed="rId4"/>
+                  <a:blip r:embed="rId5"/>
                   <a:stretch>
                     <a:fillRect l="-12195" b="-22222"/>
                   </a:stretch>
@@ -11111,8 +12139,8 @@
             </p:sp>
           </mc:Fallback>
         </mc:AlternateContent>
-        <mc:AlternateContent xmlns:mc="http://schemas.openxmlformats.org/markup-compatibility/2006">
-          <mc:Choice xmlns:a14="http://schemas.microsoft.com/office/drawing/2010/main" Requires="a14">
+        <mc:AlternateContent xmlns:mc="http://schemas.openxmlformats.org/markup-compatibility/2006" xmlns:a14="http://schemas.microsoft.com/office/drawing/2010/main">
+          <mc:Choice Requires="a14">
             <p:sp>
               <p:nvSpPr>
                 <p:cNvPr id="9" name="Rounded Rectangle 8">
@@ -11188,7 +12216,7 @@
               </p:txBody>
             </p:sp>
           </mc:Choice>
-          <mc:Fallback>
+          <mc:Fallback xmlns="">
             <p:sp>
               <p:nvSpPr>
                 <p:cNvPr id="9" name="Rounded Rectangle 8">
@@ -11212,7 +12240,7 @@
                   <a:avLst/>
                 </a:prstGeom>
                 <a:blipFill>
-                  <a:blip r:embed="rId5"/>
+                  <a:blip r:embed="rId6"/>
                   <a:stretch>
                     <a:fillRect l="-12500" b="-22222"/>
                   </a:stretch>
@@ -11238,8 +12266,8 @@
             </p:sp>
           </mc:Fallback>
         </mc:AlternateContent>
-        <mc:AlternateContent xmlns:mc="http://schemas.openxmlformats.org/markup-compatibility/2006">
-          <mc:Choice xmlns:a14="http://schemas.microsoft.com/office/drawing/2010/main" Requires="a14">
+        <mc:AlternateContent xmlns:mc="http://schemas.openxmlformats.org/markup-compatibility/2006" xmlns:a14="http://schemas.microsoft.com/office/drawing/2010/main">
+          <mc:Choice Requires="a14">
             <p:sp>
               <p:nvSpPr>
                 <p:cNvPr id="10" name="Rounded Rectangle 9">
@@ -11309,7 +12337,7 @@
               </p:txBody>
             </p:sp>
           </mc:Choice>
-          <mc:Fallback>
+          <mc:Fallback xmlns="">
             <p:sp>
               <p:nvSpPr>
                 <p:cNvPr id="10" name="Rounded Rectangle 9">
@@ -11333,7 +12361,7 @@
                   <a:avLst/>
                 </a:prstGeom>
                 <a:blipFill>
-                  <a:blip r:embed="rId6"/>
+                  <a:blip r:embed="rId7"/>
                   <a:stretch>
                     <a:fillRect/>
                   </a:stretch>
@@ -11444,8 +12472,8 @@
             </a:p>
           </p:txBody>
         </p:sp>
-        <mc:AlternateContent xmlns:mc="http://schemas.openxmlformats.org/markup-compatibility/2006">
-          <mc:Choice xmlns:a14="http://schemas.microsoft.com/office/drawing/2010/main" Requires="a14">
+        <mc:AlternateContent xmlns:mc="http://schemas.openxmlformats.org/markup-compatibility/2006" xmlns:a14="http://schemas.microsoft.com/office/drawing/2010/main">
+          <mc:Choice Requires="a14">
             <p:sp>
               <p:nvSpPr>
                 <p:cNvPr id="11" name="Rounded Rectangle 10">
@@ -11521,7 +12549,7 @@
               </p:txBody>
             </p:sp>
           </mc:Choice>
-          <mc:Fallback>
+          <mc:Fallback xmlns="">
             <p:sp>
               <p:nvSpPr>
                 <p:cNvPr id="11" name="Rounded Rectangle 10">
@@ -11545,7 +12573,7 @@
                   <a:avLst/>
                 </a:prstGeom>
                 <a:blipFill>
-                  <a:blip r:embed="rId7"/>
+                  <a:blip r:embed="rId8"/>
                   <a:stretch>
                     <a:fillRect l="-15000" b="-21622"/>
                   </a:stretch>
@@ -11571,8 +12599,8 @@
             </p:sp>
           </mc:Fallback>
         </mc:AlternateContent>
-        <mc:AlternateContent xmlns:mc="http://schemas.openxmlformats.org/markup-compatibility/2006">
-          <mc:Choice xmlns:a14="http://schemas.microsoft.com/office/drawing/2010/main" Requires="a14">
+        <mc:AlternateContent xmlns:mc="http://schemas.openxmlformats.org/markup-compatibility/2006" xmlns:a14="http://schemas.microsoft.com/office/drawing/2010/main">
+          <mc:Choice Requires="a14">
             <p:sp>
               <p:nvSpPr>
                 <p:cNvPr id="12" name="Rounded Rectangle 11">
@@ -11648,7 +12676,7 @@
               </p:txBody>
             </p:sp>
           </mc:Choice>
-          <mc:Fallback>
+          <mc:Fallback xmlns="">
             <p:sp>
               <p:nvSpPr>
                 <p:cNvPr id="12" name="Rounded Rectangle 11">
@@ -11672,7 +12700,7 @@
                   <a:avLst/>
                 </a:prstGeom>
                 <a:blipFill>
-                  <a:blip r:embed="rId8"/>
+                  <a:blip r:embed="rId9"/>
                   <a:stretch>
                     <a:fillRect l="-9756" b="-25000"/>
                   </a:stretch>
@@ -11698,8 +12726,8 @@
             </p:sp>
           </mc:Fallback>
         </mc:AlternateContent>
-        <mc:AlternateContent xmlns:mc="http://schemas.openxmlformats.org/markup-compatibility/2006">
-          <mc:Choice xmlns:a14="http://schemas.microsoft.com/office/drawing/2010/main" Requires="a14">
+        <mc:AlternateContent xmlns:mc="http://schemas.openxmlformats.org/markup-compatibility/2006" xmlns:a14="http://schemas.microsoft.com/office/drawing/2010/main">
+          <mc:Choice Requires="a14">
             <p:sp>
               <p:nvSpPr>
                 <p:cNvPr id="13" name="Rounded Rectangle 12">
@@ -11775,7 +12803,7 @@
               </p:txBody>
             </p:sp>
           </mc:Choice>
-          <mc:Fallback>
+          <mc:Fallback xmlns="">
             <p:sp>
               <p:nvSpPr>
                 <p:cNvPr id="13" name="Rounded Rectangle 12">
@@ -11799,7 +12827,7 @@
                   <a:avLst/>
                 </a:prstGeom>
                 <a:blipFill>
-                  <a:blip r:embed="rId9"/>
+                  <a:blip r:embed="rId10"/>
                   <a:stretch>
                     <a:fillRect l="-15000" b="-21622"/>
                   </a:stretch>
@@ -11825,8 +12853,8 @@
             </p:sp>
           </mc:Fallback>
         </mc:AlternateContent>
-        <mc:AlternateContent xmlns:mc="http://schemas.openxmlformats.org/markup-compatibility/2006">
-          <mc:Choice xmlns:a14="http://schemas.microsoft.com/office/drawing/2010/main" Requires="a14">
+        <mc:AlternateContent xmlns:mc="http://schemas.openxmlformats.org/markup-compatibility/2006" xmlns:a14="http://schemas.microsoft.com/office/drawing/2010/main">
+          <mc:Choice Requires="a14">
             <p:sp>
               <p:nvSpPr>
                 <p:cNvPr id="14" name="Rounded Rectangle 13">
@@ -11902,7 +12930,7 @@
               </p:txBody>
             </p:sp>
           </mc:Choice>
-          <mc:Fallback>
+          <mc:Fallback xmlns="">
             <p:sp>
               <p:nvSpPr>
                 <p:cNvPr id="14" name="Rounded Rectangle 13">
@@ -11926,7 +12954,7 @@
                   <a:avLst/>
                 </a:prstGeom>
                 <a:blipFill>
-                  <a:blip r:embed="rId10"/>
+                  <a:blip r:embed="rId11"/>
                   <a:stretch>
                     <a:fillRect l="-12195" b="-21622"/>
                   </a:stretch>
@@ -11952,8 +12980,8 @@
             </p:sp>
           </mc:Fallback>
         </mc:AlternateContent>
-        <mc:AlternateContent xmlns:mc="http://schemas.openxmlformats.org/markup-compatibility/2006">
-          <mc:Choice xmlns:a14="http://schemas.microsoft.com/office/drawing/2010/main" Requires="a14">
+        <mc:AlternateContent xmlns:mc="http://schemas.openxmlformats.org/markup-compatibility/2006" xmlns:a14="http://schemas.microsoft.com/office/drawing/2010/main">
+          <mc:Choice Requires="a14">
             <p:sp>
               <p:nvSpPr>
                 <p:cNvPr id="15" name="Rounded Rectangle 14">
@@ -12023,7 +13051,7 @@
               </p:txBody>
             </p:sp>
           </mc:Choice>
-          <mc:Fallback>
+          <mc:Fallback xmlns="">
             <p:sp>
               <p:nvSpPr>
                 <p:cNvPr id="15" name="Rounded Rectangle 14">
@@ -12047,7 +13075,7 @@
                   <a:avLst/>
                 </a:prstGeom>
                 <a:blipFill>
-                  <a:blip r:embed="rId11"/>
+                  <a:blip r:embed="rId12"/>
                   <a:stretch>
                     <a:fillRect/>
                   </a:stretch>
@@ -12205,7 +13233,7 @@
           <p:nvPr/>
         </p:nvPicPr>
         <p:blipFill rotWithShape="1">
-          <a:blip r:embed="rId2"/>
+          <a:blip r:embed="rId3"/>
           <a:srcRect r="-2" b="-2"/>
           <a:stretch/>
         </p:blipFill>
@@ -12266,7 +13294,7 @@
           <p:nvPr/>
         </p:nvPicPr>
         <p:blipFill rotWithShape="1">
-          <a:blip r:embed="rId3"/>
+          <a:blip r:embed="rId4"/>
           <a:srcRect l="4713" r="5232"/>
           <a:stretch/>
         </p:blipFill>
@@ -15111,8 +16139,8 @@
           </a:p>
         </p:txBody>
       </p:sp>
-      <mc:AlternateContent xmlns:mc="http://schemas.openxmlformats.org/markup-compatibility/2006">
-        <mc:Choice xmlns:a14="http://schemas.microsoft.com/office/drawing/2010/main" Requires="a14">
+      <mc:AlternateContent xmlns:mc="http://schemas.openxmlformats.org/markup-compatibility/2006" xmlns:a14="http://schemas.microsoft.com/office/drawing/2010/main">
+        <mc:Choice Requires="a14">
           <p:sp>
             <p:nvSpPr>
               <p:cNvPr id="5" name="Rounded Rectangle 4">
@@ -15183,7 +16211,7 @@
             </p:txBody>
           </p:sp>
         </mc:Choice>
-        <mc:Fallback>
+        <mc:Fallback xmlns="">
           <p:sp>
             <p:nvSpPr>
               <p:cNvPr id="5" name="Rounded Rectangle 4">
@@ -15207,7 +16235,7 @@
                 <a:avLst/>
               </a:prstGeom>
               <a:blipFill>
-                <a:blip r:embed="rId2"/>
+                <a:blip r:embed="rId3"/>
                 <a:stretch>
                   <a:fillRect b="-13115"/>
                 </a:stretch>
@@ -15228,8 +16256,8 @@
           </p:sp>
         </mc:Fallback>
       </mc:AlternateContent>
-      <mc:AlternateContent xmlns:mc="http://schemas.openxmlformats.org/markup-compatibility/2006">
-        <mc:Choice xmlns:a14="http://schemas.microsoft.com/office/drawing/2010/main" Requires="a14">
+      <mc:AlternateContent xmlns:mc="http://schemas.openxmlformats.org/markup-compatibility/2006" xmlns:a14="http://schemas.microsoft.com/office/drawing/2010/main">
+        <mc:Choice Requires="a14">
           <p:sp>
             <p:nvSpPr>
               <p:cNvPr id="6" name="Rounded Rectangle 5">
@@ -15300,7 +16328,7 @@
             </p:txBody>
           </p:sp>
         </mc:Choice>
-        <mc:Fallback>
+        <mc:Fallback xmlns="">
           <p:sp>
             <p:nvSpPr>
               <p:cNvPr id="6" name="Rounded Rectangle 5">
@@ -15324,7 +16352,7 @@
                 <a:avLst/>
               </a:prstGeom>
               <a:blipFill>
-                <a:blip r:embed="rId3"/>
+                <a:blip r:embed="rId4"/>
                 <a:stretch>
                   <a:fillRect b="-14754"/>
                 </a:stretch>
@@ -15345,8 +16373,8 @@
           </p:sp>
         </mc:Fallback>
       </mc:AlternateContent>
-      <mc:AlternateContent xmlns:mc="http://schemas.openxmlformats.org/markup-compatibility/2006">
-        <mc:Choice xmlns:a14="http://schemas.microsoft.com/office/drawing/2010/main" Requires="a14">
+      <mc:AlternateContent xmlns:mc="http://schemas.openxmlformats.org/markup-compatibility/2006" xmlns:a14="http://schemas.microsoft.com/office/drawing/2010/main">
+        <mc:Choice Requires="a14">
           <p:sp>
             <p:nvSpPr>
               <p:cNvPr id="7" name="Rounded Rectangle 6">
@@ -15417,7 +16445,7 @@
             </p:txBody>
           </p:sp>
         </mc:Choice>
-        <mc:Fallback>
+        <mc:Fallback xmlns="">
           <p:sp>
             <p:nvSpPr>
               <p:cNvPr id="7" name="Rounded Rectangle 6">
@@ -15441,7 +16469,7 @@
                 <a:avLst/>
               </a:prstGeom>
               <a:blipFill>
-                <a:blip r:embed="rId4"/>
+                <a:blip r:embed="rId5"/>
                 <a:stretch>
                   <a:fillRect b="-14754"/>
                 </a:stretch>
@@ -15462,8 +16490,8 @@
           </p:sp>
         </mc:Fallback>
       </mc:AlternateContent>
-      <mc:AlternateContent xmlns:mc="http://schemas.openxmlformats.org/markup-compatibility/2006">
-        <mc:Choice xmlns:a14="http://schemas.microsoft.com/office/drawing/2010/main" Requires="a14">
+      <mc:AlternateContent xmlns:mc="http://schemas.openxmlformats.org/markup-compatibility/2006" xmlns:a14="http://schemas.microsoft.com/office/drawing/2010/main">
+        <mc:Choice Requires="a14">
           <p:sp>
             <p:nvSpPr>
               <p:cNvPr id="8" name="Rounded Rectangle 7">
@@ -15534,7 +16562,7 @@
             </p:txBody>
           </p:sp>
         </mc:Choice>
-        <mc:Fallback>
+        <mc:Fallback xmlns="">
           <p:sp>
             <p:nvSpPr>
               <p:cNvPr id="8" name="Rounded Rectangle 7">
@@ -15558,7 +16586,7 @@
                 <a:avLst/>
               </a:prstGeom>
               <a:blipFill>
-                <a:blip r:embed="rId5"/>
+                <a:blip r:embed="rId6"/>
                 <a:stretch>
                   <a:fillRect b="-13115"/>
                 </a:stretch>
@@ -15669,7 +16697,7 @@
                 <a:avLst/>
               </a:prstGeom>
               <a:blipFill>
-                <a:blip r:embed="rId6"/>
+                <a:blip r:embed="rId7"/>
                 <a:stretch>
                   <a:fillRect/>
                 </a:stretch>
@@ -18225,7 +19253,7 @@
               </a:spcAft>
             </a:pPr>
             <a:r>
-              <a:rPr lang="en-US" sz="4000">
+              <a:rPr lang="en-US" sz="4000" dirty="0">
                 <a:latin typeface="+mj-lt"/>
                 <a:ea typeface="+mj-ea"/>
                 <a:cs typeface="+mj-cs"/>

</xml_diff>

<commit_message>
Add animations, conclusion, and future work
</commit_message>
<xml_diff>
--- a/presentation/SPIN2022.pptx
+++ b/presentation/SPIN2022.pptx
@@ -5,7 +5,7 @@
     <p:sldMasterId id="2147483672" r:id="rId1"/>
   </p:sldMasterIdLst>
   <p:notesMasterIdLst>
-    <p:notesMasterId r:id="rId23"/>
+    <p:notesMasterId r:id="rId24"/>
   </p:notesMasterIdLst>
   <p:sldIdLst>
     <p:sldId id="256" r:id="rId2"/>
@@ -29,6 +29,7 @@
     <p:sldId id="273" r:id="rId20"/>
     <p:sldId id="274" r:id="rId21"/>
     <p:sldId id="277" r:id="rId22"/>
+    <p:sldId id="282" r:id="rId23"/>
   </p:sldIdLst>
   <p:sldSz cx="12192000" cy="6858000"/>
   <p:notesSz cx="6858000" cy="9144000"/>
@@ -6611,8 +6612,8 @@
         </p:nvSpPr>
         <p:spPr>
           <a:xfrm>
-            <a:off x="6305922" y="3824233"/>
-            <a:ext cx="5544671" cy="400110"/>
+            <a:off x="6305922" y="3608333"/>
+            <a:ext cx="5544671" cy="707886"/>
           </a:xfrm>
           <a:prstGeom prst="rect">
             <a:avLst/>
@@ -6624,6 +6625,19 @@
             <a:spAutoFit/>
           </a:bodyPr>
           <a:lstStyle/>
+          <a:p>
+            <a:r>
+              <a:rPr lang="en-US" sz="2000" dirty="0">
+                <a:solidFill>
+                  <a:schemeClr val="accent1">
+                    <a:lumMod val="75000"/>
+                  </a:schemeClr>
+                </a:solidFill>
+                <a:latin typeface="Menlo" panose="020B0609030804020204" pitchFamily="49" charset="0"/>
+              </a:rPr>
+              <a:t>// parallel-for function</a:t>
+            </a:r>
+          </a:p>
           <a:p>
             <a:r>
               <a:rPr lang="en-US" sz="2000" b="1" dirty="0">
@@ -8533,8 +8547,8 @@
         </p:nvSpPr>
         <p:spPr>
           <a:xfrm>
-            <a:off x="409545" y="4495164"/>
-            <a:ext cx="5544671" cy="1631216"/>
+            <a:off x="409545" y="4222114"/>
+            <a:ext cx="5544671" cy="1938992"/>
           </a:xfrm>
           <a:prstGeom prst="rect">
             <a:avLst/>
@@ -8546,6 +8560,19 @@
             <a:spAutoFit/>
           </a:bodyPr>
           <a:lstStyle/>
+          <a:p>
+            <a:r>
+              <a:rPr lang="en-US" sz="2000" dirty="0">
+                <a:solidFill>
+                  <a:schemeClr val="accent1">
+                    <a:lumMod val="75000"/>
+                  </a:schemeClr>
+                </a:solidFill>
+                <a:latin typeface="Menlo" panose="020B0609030804020204" pitchFamily="49" charset="0"/>
+              </a:rPr>
+              <a:t>// while function</a:t>
+            </a:r>
+          </a:p>
           <a:p>
             <a:r>
               <a:rPr lang="en-US" sz="2000" b="1" dirty="0">
@@ -10516,6 +10543,118 @@
           <a:chExt cx="0" cy="0"/>
         </a:xfrm>
       </p:grpSpPr>
+      <p:sp>
+        <p:nvSpPr>
+          <p:cNvPr id="16" name="TextBox 15">
+            <a:extLst>
+              <a:ext uri="{FF2B5EF4-FFF2-40B4-BE49-F238E27FC236}">
+                <a16:creationId xmlns:a16="http://schemas.microsoft.com/office/drawing/2014/main" id="{FE9768D8-EF42-1844-B563-19E207A2A994}"/>
+              </a:ext>
+            </a:extLst>
+          </p:cNvPr>
+          <p:cNvSpPr txBox="1"/>
+          <p:nvPr/>
+        </p:nvSpPr>
+        <p:spPr>
+          <a:xfrm>
+            <a:off x="1296894" y="5922012"/>
+            <a:ext cx="9598211" cy="954107"/>
+          </a:xfrm>
+          <a:prstGeom prst="rect">
+            <a:avLst/>
+          </a:prstGeom>
+          <a:noFill/>
+        </p:spPr>
+        <p:txBody>
+          <a:bodyPr wrap="square" rtlCol="0">
+            <a:spAutoFit/>
+          </a:bodyPr>
+          <a:lstStyle/>
+          <a:p>
+            <a:pPr algn="ctr"/>
+            <a:r>
+              <a:rPr lang="en-US" sz="2800" dirty="0">
+                <a:solidFill>
+                  <a:schemeClr val="accent6"/>
+                </a:solidFill>
+              </a:rPr>
+              <a:t>Around 200 Lines of </a:t>
+            </a:r>
+            <a:r>
+              <a:rPr lang="en-US" sz="2800" dirty="0" err="1">
+                <a:solidFill>
+                  <a:schemeClr val="accent6"/>
+                </a:solidFill>
+              </a:rPr>
+              <a:t>Cryptol</a:t>
+            </a:r>
+            <a:r>
+              <a:rPr lang="en-US" sz="2800" dirty="0">
+                <a:solidFill>
+                  <a:schemeClr val="accent6"/>
+                </a:solidFill>
+              </a:rPr>
+              <a:t> to ponder and compare but…</a:t>
+            </a:r>
+          </a:p>
+          <a:p>
+            <a:pPr algn="ctr"/>
+            <a:endParaRPr lang="en-US" sz="2800" dirty="0">
+              <a:solidFill>
+                <a:schemeClr val="accent6"/>
+              </a:solidFill>
+            </a:endParaRPr>
+          </a:p>
+        </p:txBody>
+      </p:sp>
+      <p:sp>
+        <p:nvSpPr>
+          <p:cNvPr id="17" name="TextBox 16">
+            <a:extLst>
+              <a:ext uri="{FF2B5EF4-FFF2-40B4-BE49-F238E27FC236}">
+                <a16:creationId xmlns:a16="http://schemas.microsoft.com/office/drawing/2014/main" id="{554A2DED-34BC-2C41-A8E6-3868425F4C98}"/>
+              </a:ext>
+            </a:extLst>
+          </p:cNvPr>
+          <p:cNvSpPr txBox="1"/>
+          <p:nvPr/>
+        </p:nvSpPr>
+        <p:spPr>
+          <a:xfrm>
+            <a:off x="1296894" y="5922012"/>
+            <a:ext cx="9598211" cy="954107"/>
+          </a:xfrm>
+          <a:prstGeom prst="rect">
+            <a:avLst/>
+          </a:prstGeom>
+          <a:noFill/>
+        </p:spPr>
+        <p:txBody>
+          <a:bodyPr wrap="square" rtlCol="0">
+            <a:spAutoFit/>
+          </a:bodyPr>
+          <a:lstStyle/>
+          <a:p>
+            <a:pPr algn="ctr"/>
+            <a:endParaRPr lang="en-US" sz="2800" dirty="0">
+              <a:solidFill>
+                <a:schemeClr val="accent6"/>
+              </a:solidFill>
+            </a:endParaRPr>
+          </a:p>
+          <a:p>
+            <a:pPr algn="ctr"/>
+            <a:r>
+              <a:rPr lang="en-US" sz="2800" dirty="0">
+                <a:solidFill>
+                  <a:schemeClr val="accent6"/>
+                </a:solidFill>
+              </a:rPr>
+              <a:t>…test vectors help!</a:t>
+            </a:r>
+          </a:p>
+        </p:txBody>
+      </p:sp>
       <p:sp>
         <p:nvSpPr>
           <p:cNvPr id="2" name="Title 1">
@@ -11029,62 +11168,6 @@
           </a:p>
         </p:txBody>
       </p:sp>
-      <p:sp>
-        <p:nvSpPr>
-          <p:cNvPr id="16" name="TextBox 15">
-            <a:extLst>
-              <a:ext uri="{FF2B5EF4-FFF2-40B4-BE49-F238E27FC236}">
-                <a16:creationId xmlns:a16="http://schemas.microsoft.com/office/drawing/2014/main" id="{FE9768D8-EF42-1844-B563-19E207A2A994}"/>
-              </a:ext>
-            </a:extLst>
-          </p:cNvPr>
-          <p:cNvSpPr txBox="1"/>
-          <p:nvPr/>
-        </p:nvSpPr>
-        <p:spPr>
-          <a:xfrm>
-            <a:off x="1296894" y="5922012"/>
-            <a:ext cx="9598211" cy="523220"/>
-          </a:xfrm>
-          <a:prstGeom prst="rect">
-            <a:avLst/>
-          </a:prstGeom>
-          <a:noFill/>
-        </p:spPr>
-        <p:txBody>
-          <a:bodyPr wrap="square" rtlCol="0">
-            <a:spAutoFit/>
-          </a:bodyPr>
-          <a:lstStyle/>
-          <a:p>
-            <a:pPr algn="ctr"/>
-            <a:r>
-              <a:rPr lang="en-US" sz="2800" dirty="0">
-                <a:solidFill>
-                  <a:schemeClr val="accent6"/>
-                </a:solidFill>
-              </a:rPr>
-              <a:t>Around 200 Lines of </a:t>
-            </a:r>
-            <a:r>
-              <a:rPr lang="en-US" sz="2800" dirty="0" err="1">
-                <a:solidFill>
-                  <a:schemeClr val="accent6"/>
-                </a:solidFill>
-              </a:rPr>
-              <a:t>Cryptol</a:t>
-            </a:r>
-            <a:r>
-              <a:rPr lang="en-US" sz="2800" dirty="0">
-                <a:solidFill>
-                  <a:schemeClr val="accent6"/>
-                </a:solidFill>
-              </a:rPr>
-              <a:t> to ponder and compare</a:t>
-            </a:r>
-          </a:p>
-        </p:txBody>
-      </p:sp>
     </p:spTree>
     <p:extLst>
       <p:ext uri="{BB962C8B-B14F-4D97-AF65-F5344CB8AC3E}">
@@ -11142,6 +11225,33 @@
                                   </p:childTnLst>
                                 </p:cTn>
                               </p:par>
+                              <p:par>
+                                <p:cTn id="7" presetID="1" presetClass="entr" presetSubtype="0" fill="hold" grpId="0" nodeType="withEffect">
+                                  <p:stCondLst>
+                                    <p:cond delay="0"/>
+                                  </p:stCondLst>
+                                  <p:childTnLst>
+                                    <p:set>
+                                      <p:cBhvr>
+                                        <p:cTn id="8" dur="1" fill="hold">
+                                          <p:stCondLst>
+                                            <p:cond delay="0"/>
+                                          </p:stCondLst>
+                                        </p:cTn>
+                                        <p:tgtEl>
+                                          <p:spTgt spid="16"/>
+                                        </p:tgtEl>
+                                        <p:attrNameLst>
+                                          <p:attrName>style.visibility</p:attrName>
+                                        </p:attrNameLst>
+                                      </p:cBhvr>
+                                      <p:to>
+                                        <p:strVal val="visible"/>
+                                      </p:to>
+                                    </p:set>
+                                  </p:childTnLst>
+                                </p:cTn>
+                              </p:par>
                             </p:childTnLst>
                           </p:cTn>
                         </p:par>
@@ -11149,26 +11259,26 @@
                     </p:cTn>
                   </p:par>
                   <p:par>
-                    <p:cTn id="7" fill="hold">
+                    <p:cTn id="9" fill="hold">
                       <p:stCondLst>
                         <p:cond delay="indefinite"/>
                       </p:stCondLst>
                       <p:childTnLst>
                         <p:par>
-                          <p:cTn id="8" fill="hold">
+                          <p:cTn id="10" fill="hold">
                             <p:stCondLst>
                               <p:cond delay="0"/>
                             </p:stCondLst>
                             <p:childTnLst>
                               <p:par>
-                                <p:cTn id="9" presetID="1" presetClass="entr" presetSubtype="0" fill="hold" grpId="0" nodeType="clickEffect">
+                                <p:cTn id="11" presetID="1" presetClass="entr" presetSubtype="0" fill="hold" grpId="0" nodeType="clickEffect">
                                   <p:stCondLst>
                                     <p:cond delay="0"/>
                                   </p:stCondLst>
                                   <p:childTnLst>
                                     <p:set>
                                       <p:cBhvr>
-                                        <p:cTn id="10" dur="1" fill="hold">
+                                        <p:cTn id="12" dur="1" fill="hold">
                                           <p:stCondLst>
                                             <p:cond delay="0"/>
                                           </p:stCondLst>
@@ -11188,14 +11298,14 @@
                                 </p:cTn>
                               </p:par>
                               <p:par>
-                                <p:cTn id="11" presetID="1" presetClass="entr" presetSubtype="0" fill="hold" grpId="0" nodeType="withEffect">
+                                <p:cTn id="13" presetID="1" presetClass="entr" presetSubtype="0" fill="hold" grpId="0" nodeType="withEffect">
                                   <p:stCondLst>
                                     <p:cond delay="0"/>
                                   </p:stCondLst>
                                   <p:childTnLst>
                                     <p:set>
                                       <p:cBhvr>
-                                        <p:cTn id="12" dur="1" fill="hold">
+                                        <p:cTn id="14" dur="1" fill="hold">
                                           <p:stCondLst>
                                             <p:cond delay="0"/>
                                           </p:stCondLst>
@@ -11214,26 +11324,8 @@
                                   </p:childTnLst>
                                 </p:cTn>
                               </p:par>
-                            </p:childTnLst>
-                          </p:cTn>
-                        </p:par>
-                      </p:childTnLst>
-                    </p:cTn>
-                  </p:par>
-                  <p:par>
-                    <p:cTn id="13" fill="hold">
-                      <p:stCondLst>
-                        <p:cond delay="indefinite"/>
-                      </p:stCondLst>
-                      <p:childTnLst>
-                        <p:par>
-                          <p:cTn id="14" fill="hold">
-                            <p:stCondLst>
-                              <p:cond delay="0"/>
-                            </p:stCondLst>
-                            <p:childTnLst>
                               <p:par>
-                                <p:cTn id="15" presetID="1" presetClass="entr" presetSubtype="0" fill="hold" grpId="0" nodeType="clickEffect">
+                                <p:cTn id="15" presetID="1" presetClass="entr" presetSubtype="0" fill="hold" grpId="0" nodeType="withEffect">
                                   <p:stCondLst>
                                     <p:cond delay="0"/>
                                   </p:stCondLst>
@@ -11246,7 +11338,7 @@
                                           </p:stCondLst>
                                         </p:cTn>
                                         <p:tgtEl>
-                                          <p:spTgt spid="16"/>
+                                          <p:spTgt spid="17"/>
                                         </p:tgtEl>
                                         <p:attrNameLst>
                                           <p:attrName>style.visibility</p:attrName>
@@ -11287,10 +11379,11 @@
       </p:par>
     </p:tnLst>
     <p:bldLst>
+      <p:bldP spid="16" grpId="0"/>
+      <p:bldP spid="17" grpId="0"/>
       <p:bldP spid="13" grpId="0" animBg="1"/>
       <p:bldP spid="14" grpId="0" animBg="1"/>
       <p:bldP spid="15" grpId="0" animBg="1"/>
-      <p:bldP spid="16" grpId="0"/>
     </p:bldLst>
   </p:timing>
 </p:sld>
@@ -13518,8 +13611,8 @@
           </a:p>
         </p:txBody>
       </p:sp>
-      <mc:AlternateContent xmlns:mc="http://schemas.openxmlformats.org/markup-compatibility/2006">
-        <mc:Choice xmlns:a14="http://schemas.microsoft.com/office/drawing/2010/main" Requires="a14">
+      <mc:AlternateContent xmlns:mc="http://schemas.openxmlformats.org/markup-compatibility/2006" xmlns:a14="http://schemas.microsoft.com/office/drawing/2010/main">
+        <mc:Choice Requires="a14">
           <p:sp>
             <p:nvSpPr>
               <p:cNvPr id="30" name="TextBox 29">
@@ -14151,7 +14244,7 @@
             </p:txBody>
           </p:sp>
         </mc:Choice>
-        <mc:Fallback>
+        <mc:Fallback xmlns="">
           <p:sp>
             <p:nvSpPr>
               <p:cNvPr id="30" name="TextBox 29">
@@ -14196,6 +14289,87 @@
           </p:sp>
         </mc:Fallback>
       </mc:AlternateContent>
+      <p:sp>
+        <p:nvSpPr>
+          <p:cNvPr id="32" name="Right Brace 31">
+            <a:extLst>
+              <a:ext uri="{FF2B5EF4-FFF2-40B4-BE49-F238E27FC236}">
+                <a16:creationId xmlns:a16="http://schemas.microsoft.com/office/drawing/2014/main" id="{906E752F-E2D2-A34A-995A-DA6FE9EF1D15}"/>
+              </a:ext>
+            </a:extLst>
+          </p:cNvPr>
+          <p:cNvSpPr/>
+          <p:nvPr/>
+        </p:nvSpPr>
+        <p:spPr>
+          <a:xfrm rot="16200000">
+            <a:off x="4506709" y="3765467"/>
+            <a:ext cx="276632" cy="2292351"/>
+          </a:xfrm>
+          <a:prstGeom prst="rightBrace">
+            <a:avLst/>
+          </a:prstGeom>
+          <a:ln w="38100"/>
+        </p:spPr>
+        <p:style>
+          <a:lnRef idx="1">
+            <a:schemeClr val="accent1"/>
+          </a:lnRef>
+          <a:fillRef idx="0">
+            <a:schemeClr val="accent1"/>
+          </a:fillRef>
+          <a:effectRef idx="0">
+            <a:schemeClr val="accent1"/>
+          </a:effectRef>
+          <a:fontRef idx="minor">
+            <a:schemeClr val="tx1"/>
+          </a:fontRef>
+        </p:style>
+        <p:txBody>
+          <a:bodyPr rtlCol="0" anchor="ctr"/>
+          <a:lstStyle/>
+          <a:p>
+            <a:pPr algn="ctr"/>
+            <a:endParaRPr lang="en-US"/>
+          </a:p>
+        </p:txBody>
+      </p:sp>
+      <p:sp>
+        <p:nvSpPr>
+          <p:cNvPr id="33" name="TextBox 32">
+            <a:extLst>
+              <a:ext uri="{FF2B5EF4-FFF2-40B4-BE49-F238E27FC236}">
+                <a16:creationId xmlns:a16="http://schemas.microsoft.com/office/drawing/2014/main" id="{23E02DDB-EFC2-284B-A624-8A591EA85844}"/>
+              </a:ext>
+            </a:extLst>
+          </p:cNvPr>
+          <p:cNvSpPr txBox="1"/>
+          <p:nvPr/>
+        </p:nvSpPr>
+        <p:spPr>
+          <a:xfrm>
+            <a:off x="3642460" y="4311661"/>
+            <a:ext cx="1849158" cy="461665"/>
+          </a:xfrm>
+          <a:prstGeom prst="rect">
+            <a:avLst/>
+          </a:prstGeom>
+          <a:noFill/>
+        </p:spPr>
+        <p:txBody>
+          <a:bodyPr wrap="square" rtlCol="0">
+            <a:spAutoFit/>
+          </a:bodyPr>
+          <a:lstStyle/>
+          <a:p>
+            <a:pPr algn="ctr"/>
+            <a:r>
+              <a:rPr lang="en-US" sz="2400" dirty="0"/>
+              <a:t>Computed</a:t>
+            </a:r>
+          </a:p>
+        </p:txBody>
+      </p:sp>
     </p:spTree>
     <p:extLst>
       <p:ext uri="{BB962C8B-B14F-4D97-AF65-F5344CB8AC3E}">
@@ -17553,11 +17727,11 @@
             <p:nvPr/>
           </p:nvPicPr>
           <p:blipFill>
-            <a:blip r:embed="rId3">
+            <a:blip r:embed="rId13">
               <a:extLst>
                 <a:ext uri="{BEBA8EAE-BF5A-486C-A8C5-ECC9F3942E4B}">
                   <a14:imgProps xmlns:a14="http://schemas.microsoft.com/office/drawing/2010/main">
-                    <a14:imgLayer r:embed="rId13">
+                    <a14:imgLayer r:embed="rId14">
                       <a14:imgEffect>
                         <a14:backgroundRemoval t="1613" b="97312" l="8487" r="89668">
                           <a14:foregroundMark x1="26130" y1="89661" x2="29963" y2="90114"/>
@@ -21846,8 +22020,8 @@
           </a:p>
         </p:txBody>
       </p:sp>
-      <mc:AlternateContent xmlns:mc="http://schemas.openxmlformats.org/markup-compatibility/2006">
-        <mc:Choice xmlns:a14="http://schemas.microsoft.com/office/drawing/2010/main" Requires="a14">
+      <mc:AlternateContent xmlns:mc="http://schemas.openxmlformats.org/markup-compatibility/2006" xmlns:a14="http://schemas.microsoft.com/office/drawing/2010/main">
+        <mc:Choice Requires="a14">
           <p:graphicFrame>
             <p:nvGraphicFramePr>
               <p:cNvPr id="3" name="Table 3">
@@ -22525,7 +22699,7 @@
             </a:graphic>
           </p:graphicFrame>
         </mc:Choice>
-        <mc:Fallback>
+        <mc:Fallback xmlns="">
           <p:graphicFrame>
             <p:nvGraphicFramePr>
               <p:cNvPr id="3" name="Table 3">
@@ -23197,6 +23371,434 @@
   <p:clrMapOvr>
     <a:masterClrMapping/>
   </p:clrMapOvr>
+</p:sld>
+</file>
+
+<file path=ppt/slides/slide22.xml><?xml version="1.0" encoding="utf-8"?>
+<p:sld xmlns:a="http://schemas.openxmlformats.org/drawingml/2006/main" xmlns:r="http://schemas.openxmlformats.org/officeDocument/2006/relationships" xmlns:p="http://schemas.openxmlformats.org/presentationml/2006/main">
+  <p:cSld>
+    <p:spTree>
+      <p:nvGrpSpPr>
+        <p:cNvPr id="1" name=""/>
+        <p:cNvGrpSpPr/>
+        <p:nvPr/>
+      </p:nvGrpSpPr>
+      <p:grpSpPr>
+        <a:xfrm>
+          <a:off x="0" y="0"/>
+          <a:ext cx="0" cy="0"/>
+          <a:chOff x="0" y="0"/>
+          <a:chExt cx="0" cy="0"/>
+        </a:xfrm>
+      </p:grpSpPr>
+      <p:sp>
+        <p:nvSpPr>
+          <p:cNvPr id="2" name="Title 1">
+            <a:extLst>
+              <a:ext uri="{FF2B5EF4-FFF2-40B4-BE49-F238E27FC236}">
+                <a16:creationId xmlns:a16="http://schemas.microsoft.com/office/drawing/2014/main" id="{C1917FA5-0DD9-3E49-8576-522A7BD16DA9}"/>
+              </a:ext>
+            </a:extLst>
+          </p:cNvPr>
+          <p:cNvSpPr>
+            <a:spLocks noGrp="1"/>
+          </p:cNvSpPr>
+          <p:nvPr>
+            <p:ph type="title"/>
+          </p:nvPr>
+        </p:nvSpPr>
+        <p:spPr/>
+        <p:txBody>
+          <a:bodyPr/>
+          <a:lstStyle/>
+          <a:p>
+            <a:r>
+              <a:rPr lang="en-US" dirty="0"/>
+              <a:t>Conclusions and Future Work</a:t>
+            </a:r>
+          </a:p>
+        </p:txBody>
+      </p:sp>
+      <p:sp>
+        <p:nvSpPr>
+          <p:cNvPr id="3" name="Content Placeholder 2">
+            <a:extLst>
+              <a:ext uri="{FF2B5EF4-FFF2-40B4-BE49-F238E27FC236}">
+                <a16:creationId xmlns:a16="http://schemas.microsoft.com/office/drawing/2014/main" id="{A3358C60-5467-9F4D-9E79-46C580510F53}"/>
+              </a:ext>
+            </a:extLst>
+          </p:cNvPr>
+          <p:cNvSpPr>
+            <a:spLocks noGrp="1"/>
+          </p:cNvSpPr>
+          <p:nvPr>
+            <p:ph idx="1"/>
+          </p:nvPr>
+        </p:nvSpPr>
+        <p:spPr/>
+        <p:txBody>
+          <a:bodyPr>
+            <a:normAutofit fontScale="77500" lnSpcReduction="20000"/>
+          </a:bodyPr>
+          <a:lstStyle/>
+          <a:p>
+            <a:r>
+              <a:rPr lang="en-US" dirty="0" err="1"/>
+              <a:t>Cryptol</a:t>
+            </a:r>
+            <a:r>
+              <a:rPr lang="en-US" dirty="0"/>
+              <a:t> is well suited to SHA-3 specification</a:t>
+            </a:r>
+          </a:p>
+          <a:p>
+            <a:r>
+              <a:rPr lang="en-US" dirty="0"/>
+              <a:t>Hiding list comprehensions makes visual inspection easier</a:t>
+            </a:r>
+          </a:p>
+          <a:p>
+            <a:r>
+              <a:rPr lang="en-US" dirty="0"/>
+              <a:t>Must take intermediate step for C memory layout with OpenSSL</a:t>
+            </a:r>
+          </a:p>
+          <a:p>
+            <a:r>
+              <a:rPr lang="en-US" dirty="0">
+                <a:solidFill>
+                  <a:schemeClr val="accent6"/>
+                </a:solidFill>
+              </a:rPr>
+              <a:t>Proved new </a:t>
+            </a:r>
+            <a:r>
+              <a:rPr lang="en-US" dirty="0" err="1">
+                <a:solidFill>
+                  <a:schemeClr val="accent6"/>
+                </a:solidFill>
+              </a:rPr>
+              <a:t>Cryptol</a:t>
+            </a:r>
+            <a:r>
+              <a:rPr lang="en-US" dirty="0">
+                <a:solidFill>
+                  <a:schemeClr val="accent6"/>
+                </a:solidFill>
+              </a:rPr>
+              <a:t> specification equivalent to NIST one for 0 to 1,088 bit messages</a:t>
+            </a:r>
+          </a:p>
+          <a:p>
+            <a:r>
+              <a:rPr lang="en-US" dirty="0"/>
+              <a:t>SHA-3 modularity creates override targets (intractable without)</a:t>
+            </a:r>
+          </a:p>
+          <a:p>
+            <a:r>
+              <a:rPr lang="en-US" dirty="0">
+                <a:solidFill>
+                  <a:schemeClr val="accent6"/>
+                </a:solidFill>
+              </a:rPr>
+              <a:t>Proved </a:t>
+            </a:r>
+            <a:r>
+              <a:rPr lang="en-US" dirty="0">
+                <a:solidFill>
+                  <a:schemeClr val="accent6"/>
+                </a:solidFill>
+                <a:latin typeface="Copperplate" panose="02000504000000020004" pitchFamily="2" charset="77"/>
+              </a:rPr>
+              <a:t>Keccak </a:t>
+            </a:r>
+            <a:r>
+              <a:rPr lang="en-US" dirty="0">
+                <a:solidFill>
+                  <a:schemeClr val="accent6"/>
+                </a:solidFill>
+              </a:rPr>
+              <a:t>equivalence to OpenSSL C code for any arbitrary state</a:t>
+            </a:r>
+          </a:p>
+          <a:p>
+            <a:pPr marL="0" indent="0">
+              <a:buNone/>
+            </a:pPr>
+            <a:endParaRPr lang="en-US" dirty="0"/>
+          </a:p>
+          <a:p>
+            <a:r>
+              <a:rPr lang="en-US" dirty="0"/>
+              <a:t>Prove padding equivalence to OpenSSL</a:t>
+            </a:r>
+          </a:p>
+          <a:p>
+            <a:r>
+              <a:rPr lang="en-US" dirty="0"/>
+              <a:t>Prove squeeze equivalence to OpenSSL (some difficult type issues…)</a:t>
+            </a:r>
+          </a:p>
+          <a:p>
+            <a:r>
+              <a:rPr lang="en-US" dirty="0"/>
+              <a:t>Proof of specification against OpenSSL with padding, squeeze and </a:t>
+            </a:r>
+            <a:r>
+              <a:rPr lang="en-US" dirty="0">
+                <a:solidFill>
+                  <a:schemeClr val="tx2"/>
+                </a:solidFill>
+                <a:latin typeface="Copperplate" panose="02000504000000020004" pitchFamily="2" charset="77"/>
+              </a:rPr>
+              <a:t>Keccak</a:t>
+            </a:r>
+            <a:r>
+              <a:rPr lang="en-US" dirty="0">
+                <a:solidFill>
+                  <a:schemeClr val="accent6"/>
+                </a:solidFill>
+                <a:latin typeface="Copperplate" panose="02000504000000020004" pitchFamily="2" charset="77"/>
+              </a:rPr>
+              <a:t> </a:t>
+            </a:r>
+            <a:r>
+              <a:rPr lang="en-US" dirty="0"/>
+              <a:t>overrides</a:t>
+            </a:r>
+          </a:p>
+          <a:p>
+            <a:r>
+              <a:rPr lang="en-US" dirty="0"/>
+              <a:t>Formal argument that 0 to 1,088 bit messages sufficient for any message</a:t>
+            </a:r>
+          </a:p>
+          <a:p>
+            <a:r>
+              <a:rPr lang="en-US" dirty="0" err="1"/>
+              <a:t>Dafny</a:t>
+            </a:r>
+            <a:r>
+              <a:rPr lang="en-US" dirty="0"/>
+              <a:t> proof?</a:t>
+            </a:r>
+          </a:p>
+        </p:txBody>
+      </p:sp>
+    </p:spTree>
+    <p:extLst>
+      <p:ext uri="{BB962C8B-B14F-4D97-AF65-F5344CB8AC3E}">
+        <p14:creationId xmlns:p14="http://schemas.microsoft.com/office/powerpoint/2010/main" val="2841511471"/>
+      </p:ext>
+    </p:extLst>
+  </p:cSld>
+  <p:clrMapOvr>
+    <a:masterClrMapping/>
+  </p:clrMapOvr>
+  <p:timing>
+    <p:tnLst>
+      <p:par>
+        <p:cTn id="1" dur="indefinite" restart="never" nodeType="tmRoot">
+          <p:childTnLst>
+            <p:seq concurrent="1" nextAc="seek">
+              <p:cTn id="2" dur="indefinite" nodeType="mainSeq">
+                <p:childTnLst>
+                  <p:par>
+                    <p:cTn id="3" fill="hold">
+                      <p:stCondLst>
+                        <p:cond delay="indefinite"/>
+                      </p:stCondLst>
+                      <p:childTnLst>
+                        <p:par>
+                          <p:cTn id="4" fill="hold">
+                            <p:stCondLst>
+                              <p:cond delay="0"/>
+                            </p:stCondLst>
+                            <p:childTnLst>
+                              <p:par>
+                                <p:cTn id="5" presetID="1" presetClass="entr" presetSubtype="0" fill="hold" nodeType="clickEffect">
+                                  <p:stCondLst>
+                                    <p:cond delay="0"/>
+                                  </p:stCondLst>
+                                  <p:childTnLst>
+                                    <p:set>
+                                      <p:cBhvr>
+                                        <p:cTn id="6" dur="1" fill="hold">
+                                          <p:stCondLst>
+                                            <p:cond delay="0"/>
+                                          </p:stCondLst>
+                                        </p:cTn>
+                                        <p:tgtEl>
+                                          <p:spTgt spid="3">
+                                            <p:txEl>
+                                              <p:pRg st="7" end="7"/>
+                                            </p:txEl>
+                                          </p:spTgt>
+                                        </p:tgtEl>
+                                        <p:attrNameLst>
+                                          <p:attrName>style.visibility</p:attrName>
+                                        </p:attrNameLst>
+                                      </p:cBhvr>
+                                      <p:to>
+                                        <p:strVal val="visible"/>
+                                      </p:to>
+                                    </p:set>
+                                  </p:childTnLst>
+                                </p:cTn>
+                              </p:par>
+                              <p:par>
+                                <p:cTn id="7" presetID="1" presetClass="entr" presetSubtype="0" fill="hold" nodeType="withEffect">
+                                  <p:stCondLst>
+                                    <p:cond delay="0"/>
+                                  </p:stCondLst>
+                                  <p:childTnLst>
+                                    <p:set>
+                                      <p:cBhvr>
+                                        <p:cTn id="8" dur="1" fill="hold">
+                                          <p:stCondLst>
+                                            <p:cond delay="0"/>
+                                          </p:stCondLst>
+                                        </p:cTn>
+                                        <p:tgtEl>
+                                          <p:spTgt spid="3">
+                                            <p:txEl>
+                                              <p:pRg st="8" end="8"/>
+                                            </p:txEl>
+                                          </p:spTgt>
+                                        </p:tgtEl>
+                                        <p:attrNameLst>
+                                          <p:attrName>style.visibility</p:attrName>
+                                        </p:attrNameLst>
+                                      </p:cBhvr>
+                                      <p:to>
+                                        <p:strVal val="visible"/>
+                                      </p:to>
+                                    </p:set>
+                                  </p:childTnLst>
+                                </p:cTn>
+                              </p:par>
+                              <p:par>
+                                <p:cTn id="9" presetID="1" presetClass="entr" presetSubtype="0" fill="hold" nodeType="withEffect">
+                                  <p:stCondLst>
+                                    <p:cond delay="0"/>
+                                  </p:stCondLst>
+                                  <p:childTnLst>
+                                    <p:set>
+                                      <p:cBhvr>
+                                        <p:cTn id="10" dur="1" fill="hold">
+                                          <p:stCondLst>
+                                            <p:cond delay="0"/>
+                                          </p:stCondLst>
+                                        </p:cTn>
+                                        <p:tgtEl>
+                                          <p:spTgt spid="3">
+                                            <p:txEl>
+                                              <p:pRg st="9" end="9"/>
+                                            </p:txEl>
+                                          </p:spTgt>
+                                        </p:tgtEl>
+                                        <p:attrNameLst>
+                                          <p:attrName>style.visibility</p:attrName>
+                                        </p:attrNameLst>
+                                      </p:cBhvr>
+                                      <p:to>
+                                        <p:strVal val="visible"/>
+                                      </p:to>
+                                    </p:set>
+                                  </p:childTnLst>
+                                </p:cTn>
+                              </p:par>
+                              <p:par>
+                                <p:cTn id="11" presetID="1" presetClass="entr" presetSubtype="0" fill="hold" nodeType="withEffect">
+                                  <p:stCondLst>
+                                    <p:cond delay="0"/>
+                                  </p:stCondLst>
+                                  <p:childTnLst>
+                                    <p:set>
+                                      <p:cBhvr>
+                                        <p:cTn id="12" dur="1" fill="hold">
+                                          <p:stCondLst>
+                                            <p:cond delay="0"/>
+                                          </p:stCondLst>
+                                        </p:cTn>
+                                        <p:tgtEl>
+                                          <p:spTgt spid="3">
+                                            <p:txEl>
+                                              <p:pRg st="10" end="10"/>
+                                            </p:txEl>
+                                          </p:spTgt>
+                                        </p:tgtEl>
+                                        <p:attrNameLst>
+                                          <p:attrName>style.visibility</p:attrName>
+                                        </p:attrNameLst>
+                                      </p:cBhvr>
+                                      <p:to>
+                                        <p:strVal val="visible"/>
+                                      </p:to>
+                                    </p:set>
+                                  </p:childTnLst>
+                                </p:cTn>
+                              </p:par>
+                              <p:par>
+                                <p:cTn id="13" presetID="1" presetClass="entr" presetSubtype="0" fill="hold" nodeType="withEffect">
+                                  <p:stCondLst>
+                                    <p:cond delay="0"/>
+                                  </p:stCondLst>
+                                  <p:childTnLst>
+                                    <p:set>
+                                      <p:cBhvr>
+                                        <p:cTn id="14" dur="1" fill="hold">
+                                          <p:stCondLst>
+                                            <p:cond delay="0"/>
+                                          </p:stCondLst>
+                                        </p:cTn>
+                                        <p:tgtEl>
+                                          <p:spTgt spid="3">
+                                            <p:txEl>
+                                              <p:pRg st="11" end="11"/>
+                                            </p:txEl>
+                                          </p:spTgt>
+                                        </p:tgtEl>
+                                        <p:attrNameLst>
+                                          <p:attrName>style.visibility</p:attrName>
+                                        </p:attrNameLst>
+                                      </p:cBhvr>
+                                      <p:to>
+                                        <p:strVal val="visible"/>
+                                      </p:to>
+                                    </p:set>
+                                  </p:childTnLst>
+                                </p:cTn>
+                              </p:par>
+                            </p:childTnLst>
+                          </p:cTn>
+                        </p:par>
+                      </p:childTnLst>
+                    </p:cTn>
+                  </p:par>
+                </p:childTnLst>
+              </p:cTn>
+              <p:prevCondLst>
+                <p:cond evt="onPrev" delay="0">
+                  <p:tgtEl>
+                    <p:sldTgt/>
+                  </p:tgtEl>
+                </p:cond>
+              </p:prevCondLst>
+              <p:nextCondLst>
+                <p:cond evt="onNext" delay="0">
+                  <p:tgtEl>
+                    <p:sldTgt/>
+                  </p:tgtEl>
+                </p:cond>
+              </p:nextCondLst>
+            </p:seq>
+          </p:childTnLst>
+        </p:cTn>
+      </p:par>
+    </p:tnLst>
+  </p:timing>
 </p:sld>
 </file>
 
@@ -27448,8 +28050,8 @@
           </a:p>
         </p:txBody>
       </p:sp>
-      <mc:AlternateContent xmlns:mc="http://schemas.openxmlformats.org/markup-compatibility/2006">
-        <mc:Choice xmlns:a14="http://schemas.microsoft.com/office/drawing/2010/main" Requires="a14">
+      <mc:AlternateContent xmlns:mc="http://schemas.openxmlformats.org/markup-compatibility/2006" xmlns:a14="http://schemas.microsoft.com/office/drawing/2010/main">
+        <mc:Choice Requires="a14">
           <p:sp>
             <p:nvSpPr>
               <p:cNvPr id="14" name="TextBox 13">
@@ -27882,7 +28484,7 @@
             </p:txBody>
           </p:sp>
         </mc:Choice>
-        <mc:Fallback>
+        <mc:Fallback xmlns="">
           <p:sp>
             <p:nvSpPr>
               <p:cNvPr id="14" name="TextBox 13">
@@ -27941,7 +28543,7 @@
         </p:nvSpPr>
         <p:spPr>
           <a:xfrm>
-            <a:off x="1877860" y="5705605"/>
+            <a:off x="1877860" y="5699255"/>
             <a:ext cx="8436280" cy="646331"/>
           </a:xfrm>
           <a:prstGeom prst="rect">

</xml_diff>